<commit_message>
added first draft details for audience
</commit_message>
<xml_diff>
--- a/Google_Analytics_ZJPhotography.pptx
+++ b/Google_Analytics_ZJPhotography.pptx
@@ -5,10 +5,10 @@
     <p:sldMasterId id="2147483648" r:id="rId4"/>
   </p:sldMasterIdLst>
   <p:notesMasterIdLst>
-    <p:notesMasterId r:id="rId20"/>
+    <p:notesMasterId r:id="rId23"/>
   </p:notesMasterIdLst>
   <p:handoutMasterIdLst>
-    <p:handoutMasterId r:id="rId21"/>
+    <p:handoutMasterId r:id="rId24"/>
   </p:handoutMasterIdLst>
   <p:sldIdLst>
     <p:sldId id="292" r:id="rId5"/>
@@ -16,16 +16,19 @@
     <p:sldId id="290" r:id="rId7"/>
     <p:sldId id="294" r:id="rId8"/>
     <p:sldId id="295" r:id="rId9"/>
-    <p:sldId id="288" r:id="rId10"/>
-    <p:sldId id="281" r:id="rId11"/>
-    <p:sldId id="278" r:id="rId12"/>
-    <p:sldId id="279" r:id="rId13"/>
-    <p:sldId id="282" r:id="rId14"/>
-    <p:sldId id="284" r:id="rId15"/>
-    <p:sldId id="286" r:id="rId16"/>
-    <p:sldId id="287" r:id="rId17"/>
-    <p:sldId id="289" r:id="rId18"/>
-    <p:sldId id="256" r:id="rId19"/>
+    <p:sldId id="296" r:id="rId10"/>
+    <p:sldId id="297" r:id="rId11"/>
+    <p:sldId id="298" r:id="rId12"/>
+    <p:sldId id="288" r:id="rId13"/>
+    <p:sldId id="281" r:id="rId14"/>
+    <p:sldId id="278" r:id="rId15"/>
+    <p:sldId id="279" r:id="rId16"/>
+    <p:sldId id="282" r:id="rId17"/>
+    <p:sldId id="284" r:id="rId18"/>
+    <p:sldId id="286" r:id="rId19"/>
+    <p:sldId id="287" r:id="rId20"/>
+    <p:sldId id="289" r:id="rId21"/>
+    <p:sldId id="256" r:id="rId22"/>
   </p:sldIdLst>
   <p:sldSz cx="12192000" cy="6858000"/>
   <p:notesSz cx="6858000" cy="9144000"/>
@@ -822,7 +825,7 @@
           <a:p>
             <a:fld id="{CF9CC445-1181-4631-964C-4D0584CE199E}" type="slidenum">
               <a:rPr lang="en-US" smtClean="0"/>
-              <a:t>14</a:t>
+              <a:t>17</a:t>
             </a:fld>
             <a:endParaRPr lang="en-US" dirty="0"/>
           </a:p>
@@ -906,7 +909,7 @@
           <a:p>
             <a:fld id="{CF9CC445-1181-4631-964C-4D0584CE199E}" type="slidenum">
               <a:rPr lang="en-US" smtClean="0"/>
-              <a:t>15</a:t>
+              <a:t>18</a:t>
             </a:fld>
             <a:endParaRPr lang="en-US" dirty="0"/>
           </a:p>
@@ -990,7 +993,7 @@
           <a:p>
             <a:fld id="{CF9CC445-1181-4631-964C-4D0584CE199E}" type="slidenum">
               <a:rPr lang="en-US" smtClean="0"/>
-              <a:t>6</a:t>
+              <a:t>9</a:t>
             </a:fld>
             <a:endParaRPr lang="en-US" dirty="0"/>
           </a:p>
@@ -1074,7 +1077,7 @@
           <a:p>
             <a:fld id="{CF9CC445-1181-4631-964C-4D0584CE199E}" type="slidenum">
               <a:rPr lang="en-US" smtClean="0"/>
-              <a:t>7</a:t>
+              <a:t>10</a:t>
             </a:fld>
             <a:endParaRPr lang="en-US" dirty="0"/>
           </a:p>
@@ -1158,7 +1161,7 @@
           <a:p>
             <a:fld id="{CF9CC445-1181-4631-964C-4D0584CE199E}" type="slidenum">
               <a:rPr lang="en-US" smtClean="0"/>
-              <a:t>8</a:t>
+              <a:t>11</a:t>
             </a:fld>
             <a:endParaRPr lang="en-US" dirty="0"/>
           </a:p>
@@ -1242,7 +1245,7 @@
           <a:p>
             <a:fld id="{CF9CC445-1181-4631-964C-4D0584CE199E}" type="slidenum">
               <a:rPr lang="en-US" smtClean="0"/>
-              <a:t>9</a:t>
+              <a:t>12</a:t>
             </a:fld>
             <a:endParaRPr lang="en-US" dirty="0"/>
           </a:p>
@@ -1326,7 +1329,7 @@
           <a:p>
             <a:fld id="{CF9CC445-1181-4631-964C-4D0584CE199E}" type="slidenum">
               <a:rPr lang="en-US" smtClean="0"/>
-              <a:t>10</a:t>
+              <a:t>13</a:t>
             </a:fld>
             <a:endParaRPr lang="en-US" dirty="0"/>
           </a:p>
@@ -1410,7 +1413,7 @@
           <a:p>
             <a:fld id="{CF9CC445-1181-4631-964C-4D0584CE199E}" type="slidenum">
               <a:rPr lang="en-US" smtClean="0"/>
-              <a:t>11</a:t>
+              <a:t>14</a:t>
             </a:fld>
             <a:endParaRPr lang="en-US" dirty="0"/>
           </a:p>
@@ -1494,7 +1497,7 @@
           <a:p>
             <a:fld id="{CF9CC445-1181-4631-964C-4D0584CE199E}" type="slidenum">
               <a:rPr lang="en-US" smtClean="0"/>
-              <a:t>12</a:t>
+              <a:t>15</a:t>
             </a:fld>
             <a:endParaRPr lang="en-US" dirty="0"/>
           </a:p>
@@ -1578,7 +1581,7 @@
           <a:p>
             <a:fld id="{CF9CC445-1181-4631-964C-4D0584CE199E}" type="slidenum">
               <a:rPr lang="en-US" smtClean="0"/>
-              <a:t>13</a:t>
+              <a:t>16</a:t>
             </a:fld>
             <a:endParaRPr lang="en-US" dirty="0"/>
           </a:p>
@@ -25660,28 +25663,10 @@
       </p:grpSpPr>
       <p:sp>
         <p:nvSpPr>
-          <p:cNvPr id="23" name="Picture Placeholder 22" descr="Picture Placeholder">
-            <a:extLst>
-              <a:ext uri="{FF2B5EF4-FFF2-40B4-BE49-F238E27FC236}">
-                <a16:creationId xmlns:a16="http://schemas.microsoft.com/office/drawing/2014/main" id="{44EA1915-6FC0-476B-AC04-2E258930701A}"/>
-              </a:ext>
-            </a:extLst>
-          </p:cNvPr>
-          <p:cNvSpPr>
-            <a:spLocks noGrp="1"/>
-          </p:cNvSpPr>
-          <p:nvPr>
-            <p:ph type="pic" sz="quarter" idx="28"/>
-          </p:nvPr>
-        </p:nvSpPr>
-        <p:spPr/>
-      </p:sp>
-      <p:sp>
-        <p:nvSpPr>
-          <p:cNvPr id="24" name="Picture Placeholder 23" descr="Picture Placeholder">
-            <a:extLst>
-              <a:ext uri="{FF2B5EF4-FFF2-40B4-BE49-F238E27FC236}">
-                <a16:creationId xmlns:a16="http://schemas.microsoft.com/office/drawing/2014/main" id="{81252996-4545-412A-84F8-FA4344D49EC4}"/>
+          <p:cNvPr id="16" name="Picture Placeholder 15" descr="Picture Placeholder">
+            <a:extLst>
+              <a:ext uri="{FF2B5EF4-FFF2-40B4-BE49-F238E27FC236}">
+                <a16:creationId xmlns:a16="http://schemas.microsoft.com/office/drawing/2014/main" id="{7233204C-53AF-44D1-9A44-231690C3AC43}"/>
               </a:ext>
             </a:extLst>
           </p:cNvPr>
@@ -25696,156 +25681,10 @@
       </p:sp>
       <p:sp>
         <p:nvSpPr>
-          <p:cNvPr id="25" name="Picture Placeholder 24" descr="Picture Placeholder">
-            <a:extLst>
-              <a:ext uri="{FF2B5EF4-FFF2-40B4-BE49-F238E27FC236}">
-                <a16:creationId xmlns:a16="http://schemas.microsoft.com/office/drawing/2014/main" id="{CB0C47AF-C809-44C7-B7B2-612D4477A6E9}"/>
-              </a:ext>
-            </a:extLst>
-          </p:cNvPr>
-          <p:cNvSpPr>
-            <a:spLocks noGrp="1"/>
-          </p:cNvSpPr>
-          <p:nvPr>
-            <p:ph type="pic" sz="quarter" idx="30"/>
-          </p:nvPr>
-        </p:nvSpPr>
-        <p:spPr/>
-      </p:sp>
-      <p:sp>
-        <p:nvSpPr>
-          <p:cNvPr id="26" name="Picture Placeholder 25" descr="Picture Placeholder">
-            <a:extLst>
-              <a:ext uri="{FF2B5EF4-FFF2-40B4-BE49-F238E27FC236}">
-                <a16:creationId xmlns:a16="http://schemas.microsoft.com/office/drawing/2014/main" id="{69F7AF10-C5CD-48D2-94BD-A25544617B87}"/>
-              </a:ext>
-            </a:extLst>
-          </p:cNvPr>
-          <p:cNvSpPr>
-            <a:spLocks noGrp="1"/>
-          </p:cNvSpPr>
-          <p:nvPr>
-            <p:ph type="pic" sz="quarter" idx="31"/>
-          </p:nvPr>
-        </p:nvSpPr>
-        <p:spPr/>
-      </p:sp>
-      <p:sp>
-        <p:nvSpPr>
-          <p:cNvPr id="27" name="Picture Placeholder 26" descr="Picture Placeholder">
-            <a:extLst>
-              <a:ext uri="{FF2B5EF4-FFF2-40B4-BE49-F238E27FC236}">
-                <a16:creationId xmlns:a16="http://schemas.microsoft.com/office/drawing/2014/main" id="{4F7D5399-C327-4381-BE35-69799D52B5AC}"/>
-              </a:ext>
-            </a:extLst>
-          </p:cNvPr>
-          <p:cNvSpPr>
-            <a:spLocks noGrp="1"/>
-          </p:cNvSpPr>
-          <p:nvPr>
-            <p:ph type="pic" sz="quarter" idx="32"/>
-          </p:nvPr>
-        </p:nvSpPr>
-        <p:spPr/>
-      </p:sp>
-      <p:sp>
-        <p:nvSpPr>
-          <p:cNvPr id="28" name="Picture Placeholder 27" descr="Picture Placeholder">
-            <a:extLst>
-              <a:ext uri="{FF2B5EF4-FFF2-40B4-BE49-F238E27FC236}">
-                <a16:creationId xmlns:a16="http://schemas.microsoft.com/office/drawing/2014/main" id="{18884CF6-61AC-467E-85E5-F371F81F98F1}"/>
-              </a:ext>
-            </a:extLst>
-          </p:cNvPr>
-          <p:cNvSpPr>
-            <a:spLocks noGrp="1"/>
-          </p:cNvSpPr>
-          <p:nvPr>
-            <p:ph type="pic" sz="quarter" idx="33"/>
-          </p:nvPr>
-        </p:nvSpPr>
-        <p:spPr/>
-      </p:sp>
-      <p:sp>
-        <p:nvSpPr>
-          <p:cNvPr id="29" name="Picture Placeholder 28" descr="Picture Placeholder">
-            <a:extLst>
-              <a:ext uri="{FF2B5EF4-FFF2-40B4-BE49-F238E27FC236}">
-                <a16:creationId xmlns:a16="http://schemas.microsoft.com/office/drawing/2014/main" id="{EFE901BE-8D68-41FC-B90E-B9F22E1A9472}"/>
-              </a:ext>
-            </a:extLst>
-          </p:cNvPr>
-          <p:cNvSpPr>
-            <a:spLocks noGrp="1"/>
-          </p:cNvSpPr>
-          <p:nvPr>
-            <p:ph type="pic" sz="quarter" idx="34"/>
-          </p:nvPr>
-        </p:nvSpPr>
-        <p:spPr/>
-      </p:sp>
-      <p:sp>
-        <p:nvSpPr>
-          <p:cNvPr id="9" name="Text Placeholder 8">
-            <a:extLst>
-              <a:ext uri="{FF2B5EF4-FFF2-40B4-BE49-F238E27FC236}">
-                <a16:creationId xmlns:a16="http://schemas.microsoft.com/office/drawing/2014/main" id="{1DBCBD81-84AA-4C64-B379-E0D9268ACF2C}"/>
-              </a:ext>
-            </a:extLst>
-          </p:cNvPr>
-          <p:cNvSpPr>
-            <a:spLocks noGrp="1"/>
-          </p:cNvSpPr>
-          <p:nvPr>
-            <p:ph type="body" sz="quarter" idx="23"/>
-          </p:nvPr>
-        </p:nvSpPr>
-        <p:spPr/>
-        <p:txBody>
-          <a:bodyPr/>
-          <a:lstStyle/>
-          <a:p>
-            <a:r>
-              <a:rPr lang="en-US" dirty="0"/>
-              <a:t>Place your photo caption here</a:t>
-            </a:r>
-          </a:p>
-        </p:txBody>
-      </p:sp>
-      <p:sp>
-        <p:nvSpPr>
-          <p:cNvPr id="10" name="Text Placeholder 9">
-            <a:extLst>
-              <a:ext uri="{FF2B5EF4-FFF2-40B4-BE49-F238E27FC236}">
-                <a16:creationId xmlns:a16="http://schemas.microsoft.com/office/drawing/2014/main" id="{807E6B10-8E32-44D4-ABBF-4A9B0DA6FF0C}"/>
-              </a:ext>
-            </a:extLst>
-          </p:cNvPr>
-          <p:cNvSpPr>
-            <a:spLocks noGrp="1"/>
-          </p:cNvSpPr>
-          <p:nvPr>
-            <p:ph type="body" sz="quarter" idx="25"/>
-          </p:nvPr>
-        </p:nvSpPr>
-        <p:spPr/>
-        <p:txBody>
-          <a:bodyPr/>
-          <a:lstStyle/>
-          <a:p>
-            <a:r>
-              <a:rPr lang="en-US" dirty="0"/>
-              <a:t>Place your photo caption here</a:t>
-            </a:r>
-          </a:p>
-        </p:txBody>
-      </p:sp>
-      <p:sp>
-        <p:nvSpPr>
-          <p:cNvPr id="11" name="Slide Number Placeholder 10">
-            <a:extLst>
-              <a:ext uri="{FF2B5EF4-FFF2-40B4-BE49-F238E27FC236}">
-                <a16:creationId xmlns:a16="http://schemas.microsoft.com/office/drawing/2014/main" id="{C68DE40A-9965-4C65-9A56-313164F7C81B}"/>
+          <p:cNvPr id="3" name="Slide Number Placeholder 2">
+            <a:extLst>
+              <a:ext uri="{FF2B5EF4-FFF2-40B4-BE49-F238E27FC236}">
+                <a16:creationId xmlns:a16="http://schemas.microsoft.com/office/drawing/2014/main" id="{C637A3EA-4C15-4FDA-8CC7-3DBB3376221B}"/>
               </a:ext>
             </a:extLst>
           </p:cNvPr>
@@ -25872,10 +25711,10 @@
       </p:sp>
       <p:sp>
         <p:nvSpPr>
-          <p:cNvPr id="12" name="Title 11">
-            <a:extLst>
-              <a:ext uri="{FF2B5EF4-FFF2-40B4-BE49-F238E27FC236}">
-                <a16:creationId xmlns:a16="http://schemas.microsoft.com/office/drawing/2014/main" id="{FA3C2A35-5068-4B1A-8492-772F61018F36}"/>
+          <p:cNvPr id="4" name="Title 3">
+            <a:extLst>
+              <a:ext uri="{FF2B5EF4-FFF2-40B4-BE49-F238E27FC236}">
+                <a16:creationId xmlns:a16="http://schemas.microsoft.com/office/drawing/2014/main" id="{69BACAF3-35DA-40A1-A62F-F11FCF7F87AB}"/>
               </a:ext>
             </a:extLst>
           </p:cNvPr>
@@ -25893,17 +25732,17 @@
           <a:p>
             <a:r>
               <a:rPr lang="en-US" dirty="0"/>
-              <a:t>Variety Slide Title</a:t>
+              <a:t>Large photo with quote</a:t>
             </a:r>
           </a:p>
         </p:txBody>
       </p:sp>
       <p:sp>
         <p:nvSpPr>
-          <p:cNvPr id="13" name="Text Placeholder 12">
-            <a:extLst>
-              <a:ext uri="{FF2B5EF4-FFF2-40B4-BE49-F238E27FC236}">
-                <a16:creationId xmlns:a16="http://schemas.microsoft.com/office/drawing/2014/main" id="{8475990A-5D82-44A0-A5CE-D0E8711F1DCA}"/>
+          <p:cNvPr id="5" name="Text Placeholder 4">
+            <a:extLst>
+              <a:ext uri="{FF2B5EF4-FFF2-40B4-BE49-F238E27FC236}">
+                <a16:creationId xmlns:a16="http://schemas.microsoft.com/office/drawing/2014/main" id="{85195BC3-CA49-43AA-943D-145C631E91F3}"/>
               </a:ext>
             </a:extLst>
           </p:cNvPr>
@@ -25921,17 +25760,17 @@
           <a:p>
             <a:r>
               <a:rPr lang="en-US" dirty="0"/>
-              <a:t>Place your photo caption here</a:t>
+              <a:t>“Place your quote here”</a:t>
             </a:r>
           </a:p>
         </p:txBody>
       </p:sp>
       <p:sp>
         <p:nvSpPr>
-          <p:cNvPr id="14" name="Text Placeholder 13">
-            <a:extLst>
-              <a:ext uri="{FF2B5EF4-FFF2-40B4-BE49-F238E27FC236}">
-                <a16:creationId xmlns:a16="http://schemas.microsoft.com/office/drawing/2014/main" id="{CFD8BFB8-0EE2-4F8A-9289-B7E356E8B984}"/>
+          <p:cNvPr id="6" name="Text Placeholder 5">
+            <a:extLst>
+              <a:ext uri="{FF2B5EF4-FFF2-40B4-BE49-F238E27FC236}">
+                <a16:creationId xmlns:a16="http://schemas.microsoft.com/office/drawing/2014/main" id="{59EDDC39-7E24-4663-B47E-EFC6A37DCA0D}"/>
               </a:ext>
             </a:extLst>
           </p:cNvPr>
@@ -25939,7 +25778,7 @@
             <a:spLocks noGrp="1"/>
           </p:cNvSpPr>
           <p:nvPr>
-            <p:ph type="body" sz="quarter" idx="27"/>
+            <p:ph type="body" sz="quarter" idx="25"/>
           </p:nvPr>
         </p:nvSpPr>
         <p:spPr/>
@@ -25949,7 +25788,7 @@
           <a:p>
             <a:r>
               <a:rPr lang="en-US" dirty="0"/>
-              <a:t>BADGE TEXT</a:t>
+              <a:t>Quote date or place</a:t>
             </a:r>
           </a:p>
         </p:txBody>
@@ -25957,7 +25796,7 @@
     </p:spTree>
     <p:extLst>
       <p:ext uri="{BB962C8B-B14F-4D97-AF65-F5344CB8AC3E}">
-        <p14:creationId xmlns:p14="http://schemas.microsoft.com/office/powerpoint/2010/main" val="2299681795"/>
+        <p14:creationId xmlns:p14="http://schemas.microsoft.com/office/powerpoint/2010/main" val="183236352"/>
       </p:ext>
     </p:extLst>
   </p:cSld>
@@ -25986,10 +25825,10 @@
       </p:grpSpPr>
       <p:sp>
         <p:nvSpPr>
-          <p:cNvPr id="16" name="Text Placeholder 15">
-            <a:extLst>
-              <a:ext uri="{FF2B5EF4-FFF2-40B4-BE49-F238E27FC236}">
-                <a16:creationId xmlns:a16="http://schemas.microsoft.com/office/drawing/2014/main" id="{9AB7D099-5143-4858-9512-5E1FA28E3DE0}"/>
+          <p:cNvPr id="27" name="Picture Placeholder 26" descr="Picture Placeholder">
+            <a:extLst>
+              <a:ext uri="{FF2B5EF4-FFF2-40B4-BE49-F238E27FC236}">
+                <a16:creationId xmlns:a16="http://schemas.microsoft.com/office/drawing/2014/main" id="{8A3CA052-6658-4E1A-851A-E824CCA46C15}"/>
               </a:ext>
             </a:extLst>
           </p:cNvPr>
@@ -25997,7 +25836,61 @@
             <a:spLocks noGrp="1"/>
           </p:cNvSpPr>
           <p:nvPr>
-            <p:ph type="body" sz="quarter" idx="23"/>
+            <p:ph type="pic" sz="quarter" idx="20"/>
+          </p:nvPr>
+        </p:nvSpPr>
+        <p:spPr/>
+      </p:sp>
+      <p:sp>
+        <p:nvSpPr>
+          <p:cNvPr id="28" name="Picture Placeholder 27" descr="Picture Placeholder">
+            <a:extLst>
+              <a:ext uri="{FF2B5EF4-FFF2-40B4-BE49-F238E27FC236}">
+                <a16:creationId xmlns:a16="http://schemas.microsoft.com/office/drawing/2014/main" id="{18EE7656-71BF-48D5-AA7C-3A58D010D890}"/>
+              </a:ext>
+            </a:extLst>
+          </p:cNvPr>
+          <p:cNvSpPr>
+            <a:spLocks noGrp="1"/>
+          </p:cNvSpPr>
+          <p:nvPr>
+            <p:ph type="pic" sz="quarter" idx="21"/>
+          </p:nvPr>
+        </p:nvSpPr>
+        <p:spPr/>
+      </p:sp>
+      <p:sp>
+        <p:nvSpPr>
+          <p:cNvPr id="29" name="Picture Placeholder 28" descr="Picture Placeholder">
+            <a:extLst>
+              <a:ext uri="{FF2B5EF4-FFF2-40B4-BE49-F238E27FC236}">
+                <a16:creationId xmlns:a16="http://schemas.microsoft.com/office/drawing/2014/main" id="{8A3D1381-F90E-46F3-81A0-2217F8CDE520}"/>
+              </a:ext>
+            </a:extLst>
+          </p:cNvPr>
+          <p:cNvSpPr>
+            <a:spLocks noGrp="1"/>
+          </p:cNvSpPr>
+          <p:nvPr>
+            <p:ph type="pic" sz="quarter" idx="22"/>
+          </p:nvPr>
+        </p:nvSpPr>
+        <p:spPr/>
+      </p:sp>
+      <p:sp>
+        <p:nvSpPr>
+          <p:cNvPr id="24" name="Text Placeholder 23">
+            <a:extLst>
+              <a:ext uri="{FF2B5EF4-FFF2-40B4-BE49-F238E27FC236}">
+                <a16:creationId xmlns:a16="http://schemas.microsoft.com/office/drawing/2014/main" id="{B639CC57-DF03-441F-BE46-4048B82D7590}"/>
+              </a:ext>
+            </a:extLst>
+          </p:cNvPr>
+          <p:cNvSpPr>
+            <a:spLocks noGrp="1"/>
+          </p:cNvSpPr>
+          <p:nvPr>
+            <p:ph type="body" sz="quarter" idx="24"/>
           </p:nvPr>
         </p:nvSpPr>
         <p:spPr/>
@@ -26014,10 +25907,10 @@
       </p:sp>
       <p:sp>
         <p:nvSpPr>
-          <p:cNvPr id="18" name="Text Placeholder 17">
-            <a:extLst>
-              <a:ext uri="{FF2B5EF4-FFF2-40B4-BE49-F238E27FC236}">
-                <a16:creationId xmlns:a16="http://schemas.microsoft.com/office/drawing/2014/main" id="{E7911E24-BB7A-4A72-8A10-7F3E8D0FEE10}"/>
+          <p:cNvPr id="25" name="Picture Placeholder 24" descr="Picture Placeholder">
+            <a:extLst>
+              <a:ext uri="{FF2B5EF4-FFF2-40B4-BE49-F238E27FC236}">
+                <a16:creationId xmlns:a16="http://schemas.microsoft.com/office/drawing/2014/main" id="{236562A2-10BA-4343-9126-27DF6C423CF7}"/>
               </a:ext>
             </a:extLst>
           </p:cNvPr>
@@ -26025,7 +25918,25 @@
             <a:spLocks noGrp="1"/>
           </p:cNvSpPr>
           <p:nvPr>
-            <p:ph type="body" sz="quarter" idx="26"/>
+            <p:ph type="pic" sz="quarter" idx="18"/>
+          </p:nvPr>
+        </p:nvSpPr>
+        <p:spPr/>
+      </p:sp>
+      <p:sp>
+        <p:nvSpPr>
+          <p:cNvPr id="3" name="Text Placeholder 2">
+            <a:extLst>
+              <a:ext uri="{FF2B5EF4-FFF2-40B4-BE49-F238E27FC236}">
+                <a16:creationId xmlns:a16="http://schemas.microsoft.com/office/drawing/2014/main" id="{C0C1A276-720E-40C4-8C25-F52ACCEF61DE}"/>
+              </a:ext>
+            </a:extLst>
+          </p:cNvPr>
+          <p:cNvSpPr>
+            <a:spLocks noGrp="1"/>
+          </p:cNvSpPr>
+          <p:nvPr>
+            <p:ph type="body" sz="quarter" idx="16"/>
           </p:nvPr>
         </p:nvSpPr>
         <p:spPr/>
@@ -26035,17 +25946,17 @@
           <a:p>
             <a:r>
               <a:rPr lang="en-US" dirty="0"/>
-              <a:t>Place your photo caption here</a:t>
+              <a:t>MM 20YY</a:t>
             </a:r>
           </a:p>
         </p:txBody>
       </p:sp>
       <p:sp>
         <p:nvSpPr>
-          <p:cNvPr id="17" name="Text Placeholder 16">
-            <a:extLst>
-              <a:ext uri="{FF2B5EF4-FFF2-40B4-BE49-F238E27FC236}">
-                <a16:creationId xmlns:a16="http://schemas.microsoft.com/office/drawing/2014/main" id="{EC94C758-0E7E-44CA-8258-2DB8C357D544}"/>
+          <p:cNvPr id="4" name="Text Placeholder 3">
+            <a:extLst>
+              <a:ext uri="{FF2B5EF4-FFF2-40B4-BE49-F238E27FC236}">
+                <a16:creationId xmlns:a16="http://schemas.microsoft.com/office/drawing/2014/main" id="{41E21631-E867-4474-A0AB-B8DA732A48FA}"/>
               </a:ext>
             </a:extLst>
           </p:cNvPr>
@@ -26053,7 +25964,7 @@
             <a:spLocks noGrp="1"/>
           </p:cNvSpPr>
           <p:nvPr>
-            <p:ph type="body" sz="quarter" idx="25"/>
+            <p:ph type="body" sz="quarter" idx="14"/>
           </p:nvPr>
         </p:nvSpPr>
         <p:spPr/>
@@ -26063,17 +25974,17 @@
           <a:p>
             <a:r>
               <a:rPr lang="en-US" dirty="0"/>
-              <a:t>Place your photo caption here</a:t>
+              <a:t>A lifetime of loyal service started in Month Year</a:t>
             </a:r>
           </a:p>
         </p:txBody>
       </p:sp>
       <p:sp>
         <p:nvSpPr>
-          <p:cNvPr id="21" name="Picture Placeholder 20" descr="Picture Placeholder">
-            <a:extLst>
-              <a:ext uri="{FF2B5EF4-FFF2-40B4-BE49-F238E27FC236}">
-                <a16:creationId xmlns:a16="http://schemas.microsoft.com/office/drawing/2014/main" id="{BCCBADBF-CD83-489F-9386-F919EFF1BA00}"/>
+          <p:cNvPr id="5" name="Text Placeholder 4">
+            <a:extLst>
+              <a:ext uri="{FF2B5EF4-FFF2-40B4-BE49-F238E27FC236}">
+                <a16:creationId xmlns:a16="http://schemas.microsoft.com/office/drawing/2014/main" id="{02788C3F-BF68-4F7D-9FD3-203AA0F81D00}"/>
               </a:ext>
             </a:extLst>
           </p:cNvPr>
@@ -26081,107 +25992,31 @@
             <a:spLocks noGrp="1"/>
           </p:cNvSpPr>
           <p:nvPr>
-            <p:ph type="pic" sz="quarter" idx="29"/>
+            <p:ph type="body" sz="quarter" idx="15"/>
           </p:nvPr>
         </p:nvSpPr>
         <p:spPr/>
-      </p:sp>
-      <p:sp>
-        <p:nvSpPr>
-          <p:cNvPr id="23" name="Picture Placeholder 22" descr="Picture Placeholder">
-            <a:extLst>
-              <a:ext uri="{FF2B5EF4-FFF2-40B4-BE49-F238E27FC236}">
-                <a16:creationId xmlns:a16="http://schemas.microsoft.com/office/drawing/2014/main" id="{0405EAF9-AD97-4605-82B8-561E3E5E06A6}"/>
-              </a:ext>
-            </a:extLst>
-          </p:cNvPr>
-          <p:cNvSpPr>
-            <a:spLocks noGrp="1"/>
-          </p:cNvSpPr>
-          <p:nvPr>
-            <p:ph type="pic" sz="quarter" idx="31"/>
-          </p:nvPr>
-        </p:nvSpPr>
-        <p:spPr/>
-      </p:sp>
-      <p:sp>
-        <p:nvSpPr>
-          <p:cNvPr id="25" name="Picture Placeholder 24" descr="Picture Placeholder">
-            <a:extLst>
-              <a:ext uri="{FF2B5EF4-FFF2-40B4-BE49-F238E27FC236}">
-                <a16:creationId xmlns:a16="http://schemas.microsoft.com/office/drawing/2014/main" id="{3C5CA835-9D6A-474A-8BE2-1EE6651D266F}"/>
-              </a:ext>
-            </a:extLst>
-          </p:cNvPr>
-          <p:cNvSpPr>
-            <a:spLocks noGrp="1"/>
-          </p:cNvSpPr>
-          <p:nvPr>
-            <p:ph type="pic" sz="quarter" idx="34"/>
-          </p:nvPr>
-        </p:nvSpPr>
-        <p:spPr/>
-      </p:sp>
-      <p:sp>
-        <p:nvSpPr>
-          <p:cNvPr id="24" name="Picture Placeholder 23" descr="Picture Placeholder">
-            <a:extLst>
-              <a:ext uri="{FF2B5EF4-FFF2-40B4-BE49-F238E27FC236}">
-                <a16:creationId xmlns:a16="http://schemas.microsoft.com/office/drawing/2014/main" id="{F59C24B6-4C8C-4212-89FC-8DB10A4E5F24}"/>
-              </a:ext>
-            </a:extLst>
-          </p:cNvPr>
-          <p:cNvSpPr>
-            <a:spLocks noGrp="1"/>
-          </p:cNvSpPr>
-          <p:nvPr>
-            <p:ph type="pic" sz="quarter" idx="32"/>
-          </p:nvPr>
-        </p:nvSpPr>
-        <p:spPr/>
-      </p:sp>
-      <p:sp>
-        <p:nvSpPr>
-          <p:cNvPr id="20" name="Picture Placeholder 19" descr="Picture Placeholder">
-            <a:extLst>
-              <a:ext uri="{FF2B5EF4-FFF2-40B4-BE49-F238E27FC236}">
-                <a16:creationId xmlns:a16="http://schemas.microsoft.com/office/drawing/2014/main" id="{A75316D0-71EB-49B3-8C05-2796276317CB}"/>
-              </a:ext>
-            </a:extLst>
-          </p:cNvPr>
-          <p:cNvSpPr>
-            <a:spLocks noGrp="1"/>
-          </p:cNvSpPr>
-          <p:nvPr>
-            <p:ph type="pic" sz="quarter" idx="28"/>
-          </p:nvPr>
-        </p:nvSpPr>
-        <p:spPr/>
-      </p:sp>
-      <p:sp>
-        <p:nvSpPr>
-          <p:cNvPr id="22" name="Picture Placeholder 21" descr="Picture Placeholder">
-            <a:extLst>
-              <a:ext uri="{FF2B5EF4-FFF2-40B4-BE49-F238E27FC236}">
-                <a16:creationId xmlns:a16="http://schemas.microsoft.com/office/drawing/2014/main" id="{FC8CE03B-7514-40C6-9AAE-72F72D180909}"/>
-              </a:ext>
-            </a:extLst>
-          </p:cNvPr>
-          <p:cNvSpPr>
-            <a:spLocks noGrp="1"/>
-          </p:cNvSpPr>
-          <p:nvPr>
-            <p:ph type="pic" sz="quarter" idx="30"/>
-          </p:nvPr>
-        </p:nvSpPr>
-        <p:spPr/>
-      </p:sp>
-      <p:sp>
-        <p:nvSpPr>
-          <p:cNvPr id="12" name="Slide Number Placeholder 11">
-            <a:extLst>
-              <a:ext uri="{FF2B5EF4-FFF2-40B4-BE49-F238E27FC236}">
-                <a16:creationId xmlns:a16="http://schemas.microsoft.com/office/drawing/2014/main" id="{52702D28-3072-4358-B0D1-3F20E90EECD3}"/>
+        <p:txBody>
+          <a:bodyPr/>
+          <a:lstStyle/>
+          <a:p>
+            <a:r>
+              <a:rPr lang="en-US" dirty="0"/>
+              <a:t>Lorem </a:t>
+            </a:r>
+            <a:r>
+              <a:rPr lang="en-US" noProof="1"/>
+              <a:t>ipsum dolor sit amet, consectetur adipiscing elit.</a:t>
+            </a:r>
+          </a:p>
+        </p:txBody>
+      </p:sp>
+      <p:sp>
+        <p:nvSpPr>
+          <p:cNvPr id="6" name="Slide Number Placeholder 5">
+            <a:extLst>
+              <a:ext uri="{FF2B5EF4-FFF2-40B4-BE49-F238E27FC236}">
+                <a16:creationId xmlns:a16="http://schemas.microsoft.com/office/drawing/2014/main" id="{78591B84-5676-4CBE-A23F-62891B1252FE}"/>
               </a:ext>
             </a:extLst>
           </p:cNvPr>
@@ -26208,10 +26043,112 @@
       </p:sp>
       <p:sp>
         <p:nvSpPr>
-          <p:cNvPr id="15" name="Title 14">
-            <a:extLst>
-              <a:ext uri="{FF2B5EF4-FFF2-40B4-BE49-F238E27FC236}">
-                <a16:creationId xmlns:a16="http://schemas.microsoft.com/office/drawing/2014/main" id="{B92F51A5-0461-4206-9A23-2C02EA7C8E8A}"/>
+          <p:cNvPr id="7" name="Text Placeholder 6">
+            <a:extLst>
+              <a:ext uri="{FF2B5EF4-FFF2-40B4-BE49-F238E27FC236}">
+                <a16:creationId xmlns:a16="http://schemas.microsoft.com/office/drawing/2014/main" id="{E91FA764-04D6-4EF8-A3E3-2E23DE9AB081}"/>
+              </a:ext>
+            </a:extLst>
+          </p:cNvPr>
+          <p:cNvSpPr>
+            <a:spLocks noGrp="1"/>
+          </p:cNvSpPr>
+          <p:nvPr>
+            <p:ph type="body" sz="quarter" idx="12"/>
+          </p:nvPr>
+        </p:nvSpPr>
+        <p:spPr/>
+        <p:txBody>
+          <a:bodyPr/>
+          <a:lstStyle/>
+          <a:p>
+            <a:r>
+              <a:rPr lang="en-US" dirty="0"/>
+              <a:t>Celebrating the retirement of:</a:t>
+            </a:r>
+          </a:p>
+        </p:txBody>
+      </p:sp>
+      <p:sp>
+        <p:nvSpPr>
+          <p:cNvPr id="9" name="Text Placeholder 8">
+            <a:extLst>
+              <a:ext uri="{FF2B5EF4-FFF2-40B4-BE49-F238E27FC236}">
+                <a16:creationId xmlns:a16="http://schemas.microsoft.com/office/drawing/2014/main" id="{1D226037-F2FE-428F-8D45-05FAD6BFC3A9}"/>
+              </a:ext>
+            </a:extLst>
+          </p:cNvPr>
+          <p:cNvSpPr>
+            <a:spLocks noGrp="1"/>
+          </p:cNvSpPr>
+          <p:nvPr>
+            <p:ph type="body" sz="quarter" idx="17"/>
+          </p:nvPr>
+        </p:nvSpPr>
+        <p:spPr/>
+        <p:txBody>
+          <a:bodyPr/>
+          <a:lstStyle/>
+          <a:p>
+            <a:r>
+              <a:rPr lang="en-US" dirty="0"/>
+              <a:t>Lorem ipsum dolor sit amet</a:t>
+            </a:r>
+          </a:p>
+        </p:txBody>
+      </p:sp>
+      <p:sp>
+        <p:nvSpPr>
+          <p:cNvPr id="26" name="Picture Placeholder 25" descr="Picture Placeholder">
+            <a:extLst>
+              <a:ext uri="{FF2B5EF4-FFF2-40B4-BE49-F238E27FC236}">
+                <a16:creationId xmlns:a16="http://schemas.microsoft.com/office/drawing/2014/main" id="{74B4C9EA-4D60-48DE-9915-B57516D650F8}"/>
+              </a:ext>
+            </a:extLst>
+          </p:cNvPr>
+          <p:cNvSpPr>
+            <a:spLocks noGrp="1"/>
+          </p:cNvSpPr>
+          <p:nvPr>
+            <p:ph type="pic" sz="quarter" idx="19"/>
+          </p:nvPr>
+        </p:nvSpPr>
+        <p:spPr/>
+      </p:sp>
+      <p:sp>
+        <p:nvSpPr>
+          <p:cNvPr id="23" name="Text Placeholder 22">
+            <a:extLst>
+              <a:ext uri="{FF2B5EF4-FFF2-40B4-BE49-F238E27FC236}">
+                <a16:creationId xmlns:a16="http://schemas.microsoft.com/office/drawing/2014/main" id="{719633D1-F8B7-48A2-914F-B7CF795760D3}"/>
+              </a:ext>
+            </a:extLst>
+          </p:cNvPr>
+          <p:cNvSpPr>
+            <a:spLocks noGrp="1"/>
+          </p:cNvSpPr>
+          <p:nvPr>
+            <p:ph type="body" sz="quarter" idx="23"/>
+          </p:nvPr>
+        </p:nvSpPr>
+        <p:spPr/>
+        <p:txBody>
+          <a:bodyPr/>
+          <a:lstStyle/>
+          <a:p>
+            <a:r>
+              <a:rPr lang="en-US" dirty="0"/>
+              <a:t>Celebrating the retirement of:</a:t>
+            </a:r>
+          </a:p>
+        </p:txBody>
+      </p:sp>
+      <p:sp>
+        <p:nvSpPr>
+          <p:cNvPr id="17" name="Title 16">
+            <a:extLst>
+              <a:ext uri="{FF2B5EF4-FFF2-40B4-BE49-F238E27FC236}">
+                <a16:creationId xmlns:a16="http://schemas.microsoft.com/office/drawing/2014/main" id="{4A3716E1-DF36-4A1C-BCD5-CECB9199FF7F}"/>
               </a:ext>
             </a:extLst>
           </p:cNvPr>
@@ -26229,35 +26166,7 @@
           <a:p>
             <a:r>
               <a:rPr lang="en-US" dirty="0"/>
-              <a:t>Variety Slide Title</a:t>
-            </a:r>
-          </a:p>
-        </p:txBody>
-      </p:sp>
-      <p:sp>
-        <p:nvSpPr>
-          <p:cNvPr id="19" name="Text Placeholder 18">
-            <a:extLst>
-              <a:ext uri="{FF2B5EF4-FFF2-40B4-BE49-F238E27FC236}">
-                <a16:creationId xmlns:a16="http://schemas.microsoft.com/office/drawing/2014/main" id="{494EEBF9-D95A-4AFE-B261-70BDCA07FAF3}"/>
-              </a:ext>
-            </a:extLst>
-          </p:cNvPr>
-          <p:cNvSpPr>
-            <a:spLocks noGrp="1"/>
-          </p:cNvSpPr>
-          <p:nvPr>
-            <p:ph type="body" sz="quarter" idx="27"/>
-          </p:nvPr>
-        </p:nvSpPr>
-        <p:spPr/>
-        <p:txBody>
-          <a:bodyPr/>
-          <a:lstStyle/>
-          <a:p>
-            <a:r>
-              <a:rPr lang="en-US" dirty="0"/>
-              <a:t>BADGE TEXT</a:t>
+              <a:t>ALLAN MARTENSSON</a:t>
             </a:r>
           </a:p>
         </p:txBody>
@@ -26265,7 +26174,7 @@
     </p:spTree>
     <p:extLst>
       <p:ext uri="{BB962C8B-B14F-4D97-AF65-F5344CB8AC3E}">
-        <p14:creationId xmlns:p14="http://schemas.microsoft.com/office/powerpoint/2010/main" val="441278867"/>
+        <p14:creationId xmlns:p14="http://schemas.microsoft.com/office/powerpoint/2010/main" val="62837122"/>
       </p:ext>
     </p:extLst>
   </p:cSld>
@@ -26294,10 +26203,10 @@
       </p:grpSpPr>
       <p:sp>
         <p:nvSpPr>
-          <p:cNvPr id="10" name="Text Placeholder 9">
-            <a:extLst>
-              <a:ext uri="{FF2B5EF4-FFF2-40B4-BE49-F238E27FC236}">
-                <a16:creationId xmlns:a16="http://schemas.microsoft.com/office/drawing/2014/main" id="{519DF788-4FF7-4948-89FE-77EAB056C847}"/>
+          <p:cNvPr id="2" name="Slide Number Placeholder 1">
+            <a:extLst>
+              <a:ext uri="{FF2B5EF4-FFF2-40B4-BE49-F238E27FC236}">
+                <a16:creationId xmlns:a16="http://schemas.microsoft.com/office/drawing/2014/main" id="{79FA378D-DD84-4591-8FB7-2E1F35C45007}"/>
               </a:ext>
             </a:extLst>
           </p:cNvPr>
@@ -26305,7 +26214,115 @@
             <a:spLocks noGrp="1"/>
           </p:cNvSpPr>
           <p:nvPr>
-            <p:ph type="body" sz="quarter" idx="25"/>
+            <p:ph type="sldNum" sz="quarter" idx="27"/>
+          </p:nvPr>
+        </p:nvSpPr>
+        <p:spPr>
+          <a:xfrm>
+            <a:off x="11473200" y="6314825"/>
+            <a:ext cx="360000" cy="360000"/>
+          </a:xfrm>
+        </p:spPr>
+        <p:txBody>
+          <a:bodyPr/>
+          <a:lstStyle/>
+          <a:p>
+            <a:fld id="{26699011-AD31-4C1E-9097-A1CA72DD0DA4}" type="slidenum">
+              <a:rPr lang="en-US" smtClean="0"/>
+              <a:t>12</a:t>
+            </a:fld>
+            <a:endParaRPr lang="en-US" dirty="0"/>
+          </a:p>
+        </p:txBody>
+      </p:sp>
+      <p:sp>
+        <p:nvSpPr>
+          <p:cNvPr id="3" name="Title 2">
+            <a:extLst>
+              <a:ext uri="{FF2B5EF4-FFF2-40B4-BE49-F238E27FC236}">
+                <a16:creationId xmlns:a16="http://schemas.microsoft.com/office/drawing/2014/main" id="{804DF0BC-FF6D-4A57-B5B0-6E7A67BBAF13}"/>
+              </a:ext>
+            </a:extLst>
+          </p:cNvPr>
+          <p:cNvSpPr>
+            <a:spLocks noGrp="1"/>
+          </p:cNvSpPr>
+          <p:nvPr>
+            <p:ph type="title"/>
+          </p:nvPr>
+        </p:nvSpPr>
+        <p:spPr>
+          <a:xfrm>
+            <a:off x="504000" y="359999"/>
+            <a:ext cx="2982435" cy="941192"/>
+          </a:xfrm>
+        </p:spPr>
+        <p:txBody>
+          <a:bodyPr/>
+          <a:lstStyle/>
+          <a:p>
+            <a:r>
+              <a:rPr lang="en-US" dirty="0"/>
+              <a:t>Lorem ipsum dolor sit amet</a:t>
+            </a:r>
+          </a:p>
+        </p:txBody>
+      </p:sp>
+      <p:sp>
+        <p:nvSpPr>
+          <p:cNvPr id="4" name="Picture Placeholder 3" descr="Picture Placeholder">
+            <a:extLst>
+              <a:ext uri="{FF2B5EF4-FFF2-40B4-BE49-F238E27FC236}">
+                <a16:creationId xmlns:a16="http://schemas.microsoft.com/office/drawing/2014/main" id="{52EB6368-1A65-4F6F-A747-115378A6CD2B}"/>
+              </a:ext>
+            </a:extLst>
+          </p:cNvPr>
+          <p:cNvSpPr>
+            <a:spLocks noGrp="1"/>
+          </p:cNvSpPr>
+          <p:nvPr>
+            <p:ph type="pic" sz="quarter" idx="12"/>
+          </p:nvPr>
+        </p:nvSpPr>
+        <p:spPr>
+          <a:xfrm>
+            <a:off x="504000" y="1754341"/>
+            <a:ext cx="3771720" cy="4190384"/>
+          </a:xfrm>
+        </p:spPr>
+      </p:sp>
+      <p:sp>
+        <p:nvSpPr>
+          <p:cNvPr id="7" name="Picture Placeholder 6" descr="Picture Placeholder">
+            <a:extLst>
+              <a:ext uri="{FF2B5EF4-FFF2-40B4-BE49-F238E27FC236}">
+                <a16:creationId xmlns:a16="http://schemas.microsoft.com/office/drawing/2014/main" id="{EC84771B-53C1-4CB9-9C9D-D26609E3A6EB}"/>
+              </a:ext>
+            </a:extLst>
+          </p:cNvPr>
+          <p:cNvSpPr>
+            <a:spLocks noGrp="1"/>
+          </p:cNvSpPr>
+          <p:nvPr>
+            <p:ph type="pic" sz="quarter" idx="15"/>
+          </p:nvPr>
+        </p:nvSpPr>
+        <p:spPr/>
+      </p:sp>
+      <p:sp>
+        <p:nvSpPr>
+          <p:cNvPr id="8" name="Text Placeholder 7">
+            <a:extLst>
+              <a:ext uri="{FF2B5EF4-FFF2-40B4-BE49-F238E27FC236}">
+                <a16:creationId xmlns:a16="http://schemas.microsoft.com/office/drawing/2014/main" id="{BA5C46C8-7AEC-4B80-A502-878CAAB06E45}"/>
+              </a:ext>
+            </a:extLst>
+          </p:cNvPr>
+          <p:cNvSpPr>
+            <a:spLocks noGrp="1"/>
+          </p:cNvSpPr>
+          <p:nvPr>
+            <p:ph type="body" sz="quarter" idx="24"/>
           </p:nvPr>
         </p:nvSpPr>
         <p:spPr/>
@@ -26322,10 +26339,10 @@
       </p:sp>
       <p:sp>
         <p:nvSpPr>
-          <p:cNvPr id="14" name="Picture Placeholder 13" descr="Picture Placeholder">
-            <a:extLst>
-              <a:ext uri="{FF2B5EF4-FFF2-40B4-BE49-F238E27FC236}">
-                <a16:creationId xmlns:a16="http://schemas.microsoft.com/office/drawing/2014/main" id="{BE681F5F-8E34-45D0-804F-ADB8B7792213}"/>
+          <p:cNvPr id="10" name="Text Placeholder 9">
+            <a:extLst>
+              <a:ext uri="{FF2B5EF4-FFF2-40B4-BE49-F238E27FC236}">
+                <a16:creationId xmlns:a16="http://schemas.microsoft.com/office/drawing/2014/main" id="{CD5C4BBB-56DC-4769-BB07-29F781939080}"/>
               </a:ext>
             </a:extLst>
           </p:cNvPr>
@@ -26333,125 +26350,7 @@
             <a:spLocks noGrp="1"/>
           </p:cNvSpPr>
           <p:nvPr>
-            <p:ph type="pic" sz="quarter" idx="29"/>
-          </p:nvPr>
-        </p:nvSpPr>
-        <p:spPr/>
-      </p:sp>
-      <p:sp>
-        <p:nvSpPr>
-          <p:cNvPr id="15" name="Picture Placeholder 14" descr="Picture Placeholder">
-            <a:extLst>
-              <a:ext uri="{FF2B5EF4-FFF2-40B4-BE49-F238E27FC236}">
-                <a16:creationId xmlns:a16="http://schemas.microsoft.com/office/drawing/2014/main" id="{70CF1D92-F14C-47CF-B09E-5338176C9224}"/>
-              </a:ext>
-            </a:extLst>
-          </p:cNvPr>
-          <p:cNvSpPr>
-            <a:spLocks noGrp="1"/>
-          </p:cNvSpPr>
-          <p:nvPr>
-            <p:ph type="pic" sz="quarter" idx="30"/>
-          </p:nvPr>
-        </p:nvSpPr>
-        <p:spPr/>
-      </p:sp>
-      <p:sp>
-        <p:nvSpPr>
-          <p:cNvPr id="16" name="Picture Placeholder 15" descr="Picture Placeholder">
-            <a:extLst>
-              <a:ext uri="{FF2B5EF4-FFF2-40B4-BE49-F238E27FC236}">
-                <a16:creationId xmlns:a16="http://schemas.microsoft.com/office/drawing/2014/main" id="{9A2DED56-7966-437B-9BBD-F392C6D9A0A1}"/>
-              </a:ext>
-            </a:extLst>
-          </p:cNvPr>
-          <p:cNvSpPr>
-            <a:spLocks noGrp="1"/>
-          </p:cNvSpPr>
-          <p:nvPr>
-            <p:ph type="pic" sz="quarter" idx="31"/>
-          </p:nvPr>
-        </p:nvSpPr>
-        <p:spPr/>
-      </p:sp>
-      <p:sp>
-        <p:nvSpPr>
-          <p:cNvPr id="17" name="Picture Placeholder 16" descr="Picture Placeholder">
-            <a:extLst>
-              <a:ext uri="{FF2B5EF4-FFF2-40B4-BE49-F238E27FC236}">
-                <a16:creationId xmlns:a16="http://schemas.microsoft.com/office/drawing/2014/main" id="{E413CE35-E99B-4675-9298-159AA851BDD6}"/>
-              </a:ext>
-            </a:extLst>
-          </p:cNvPr>
-          <p:cNvSpPr>
-            <a:spLocks noGrp="1"/>
-          </p:cNvSpPr>
-          <p:nvPr>
-            <p:ph type="pic" sz="quarter" idx="32"/>
-          </p:nvPr>
-        </p:nvSpPr>
-        <p:spPr/>
-      </p:sp>
-      <p:sp>
-        <p:nvSpPr>
-          <p:cNvPr id="18" name="Picture Placeholder 17" descr="Picture Placeholder">
-            <a:extLst>
-              <a:ext uri="{FF2B5EF4-FFF2-40B4-BE49-F238E27FC236}">
-                <a16:creationId xmlns:a16="http://schemas.microsoft.com/office/drawing/2014/main" id="{54482BF7-728B-48BB-9A7A-30788D375384}"/>
-              </a:ext>
-            </a:extLst>
-          </p:cNvPr>
-          <p:cNvSpPr>
-            <a:spLocks noGrp="1"/>
-          </p:cNvSpPr>
-          <p:nvPr>
-            <p:ph type="pic" sz="quarter" idx="33"/>
-          </p:nvPr>
-        </p:nvSpPr>
-        <p:spPr/>
-      </p:sp>
-      <p:sp>
-        <p:nvSpPr>
-          <p:cNvPr id="13" name="Text Placeholder 12">
-            <a:extLst>
-              <a:ext uri="{FF2B5EF4-FFF2-40B4-BE49-F238E27FC236}">
-                <a16:creationId xmlns:a16="http://schemas.microsoft.com/office/drawing/2014/main" id="{D9CC906F-B634-423C-9900-86A07F935905}"/>
-              </a:ext>
-            </a:extLst>
-          </p:cNvPr>
-          <p:cNvSpPr>
-            <a:spLocks noGrp="1"/>
-          </p:cNvSpPr>
-          <p:nvPr>
-            <p:ph type="body" sz="quarter" idx="28"/>
-          </p:nvPr>
-        </p:nvSpPr>
-        <p:spPr/>
-        <p:txBody>
-          <a:bodyPr/>
-          <a:lstStyle/>
-          <a:p>
-            <a:r>
-              <a:rPr lang="en-US" dirty="0"/>
-              <a:t>BADGE TEXT</a:t>
-            </a:r>
-          </a:p>
-        </p:txBody>
-      </p:sp>
-      <p:sp>
-        <p:nvSpPr>
-          <p:cNvPr id="11" name="Text Placeholder 10">
-            <a:extLst>
-              <a:ext uri="{FF2B5EF4-FFF2-40B4-BE49-F238E27FC236}">
-                <a16:creationId xmlns:a16="http://schemas.microsoft.com/office/drawing/2014/main" id="{B887DAA9-CC06-4747-8C68-ACE468BF0FF3}"/>
-              </a:ext>
-            </a:extLst>
-          </p:cNvPr>
-          <p:cNvSpPr>
-            <a:spLocks noGrp="1"/>
-          </p:cNvSpPr>
-          <p:nvPr>
-            <p:ph type="body" sz="quarter" idx="26"/>
+            <p:ph type="body" sz="quarter" idx="25"/>
           </p:nvPr>
         </p:nvSpPr>
         <p:spPr/>
@@ -26468,10 +26367,10 @@
       </p:sp>
       <p:sp>
         <p:nvSpPr>
-          <p:cNvPr id="9" name="Text Placeholder 8">
-            <a:extLst>
-              <a:ext uri="{FF2B5EF4-FFF2-40B4-BE49-F238E27FC236}">
-                <a16:creationId xmlns:a16="http://schemas.microsoft.com/office/drawing/2014/main" id="{899B43A3-504D-44F5-A22A-9627D2C19827}"/>
+          <p:cNvPr id="11" name="Text Placeholder 10">
+            <a:extLst>
+              <a:ext uri="{FF2B5EF4-FFF2-40B4-BE49-F238E27FC236}">
+                <a16:creationId xmlns:a16="http://schemas.microsoft.com/office/drawing/2014/main" id="{29258BDE-BFDE-DD45-843E-5BBCDE780080}"/>
               </a:ext>
             </a:extLst>
           </p:cNvPr>
@@ -26488,102 +26387,17 @@
           <a:lstStyle/>
           <a:p>
             <a:r>
-              <a:rPr lang="en-US" dirty="0"/>
-              <a:t>Place your photo caption here</a:t>
+              <a:rPr lang="en-US" dirty="0" err="1"/>
+              <a:t>saf</a:t>
             </a:r>
-          </a:p>
-        </p:txBody>
-      </p:sp>
-      <p:sp>
-        <p:nvSpPr>
-          <p:cNvPr id="12" name="Text Placeholder 11">
-            <a:extLst>
-              <a:ext uri="{FF2B5EF4-FFF2-40B4-BE49-F238E27FC236}">
-                <a16:creationId xmlns:a16="http://schemas.microsoft.com/office/drawing/2014/main" id="{1A6375B8-230B-4993-A0F4-C2D3C0628E22}"/>
-              </a:ext>
-            </a:extLst>
-          </p:cNvPr>
-          <p:cNvSpPr>
-            <a:spLocks noGrp="1"/>
-          </p:cNvSpPr>
-          <p:nvPr>
-            <p:ph type="body" sz="quarter" idx="27"/>
-          </p:nvPr>
-        </p:nvSpPr>
-        <p:spPr/>
-        <p:txBody>
-          <a:bodyPr/>
-          <a:lstStyle/>
-          <a:p>
-            <a:r>
-              <a:rPr lang="en-US" dirty="0"/>
-              <a:t>Place your photo caption here</a:t>
-            </a:r>
-          </a:p>
-        </p:txBody>
-      </p:sp>
-      <p:sp>
-        <p:nvSpPr>
-          <p:cNvPr id="4" name="Slide Number Placeholder 3">
-            <a:extLst>
-              <a:ext uri="{FF2B5EF4-FFF2-40B4-BE49-F238E27FC236}">
-                <a16:creationId xmlns:a16="http://schemas.microsoft.com/office/drawing/2014/main" id="{904A7568-1FD6-4570-92EE-2EF5E9DE3FAF}"/>
-              </a:ext>
-            </a:extLst>
-          </p:cNvPr>
-          <p:cNvSpPr>
-            <a:spLocks noGrp="1"/>
-          </p:cNvSpPr>
-          <p:nvPr>
-            <p:ph type="sldNum" sz="quarter" idx="11"/>
-          </p:nvPr>
-        </p:nvSpPr>
-        <p:spPr/>
-        <p:txBody>
-          <a:bodyPr/>
-          <a:lstStyle/>
-          <a:p>
-            <a:fld id="{26699011-AD31-4C1E-9097-A1CA72DD0DA4}" type="slidenum">
-              <a:rPr lang="en-US" smtClean="0"/>
-              <a:pPr/>
-              <a:t>12</a:t>
-            </a:fld>
             <a:endParaRPr lang="en-US" dirty="0"/>
-          </a:p>
-        </p:txBody>
-      </p:sp>
-      <p:sp>
-        <p:nvSpPr>
-          <p:cNvPr id="8" name="Title 7">
-            <a:extLst>
-              <a:ext uri="{FF2B5EF4-FFF2-40B4-BE49-F238E27FC236}">
-                <a16:creationId xmlns:a16="http://schemas.microsoft.com/office/drawing/2014/main" id="{7E1A6561-3F7B-4658-A1EF-FCA8AB6A9CAC}"/>
-              </a:ext>
-            </a:extLst>
-          </p:cNvPr>
-          <p:cNvSpPr>
-            <a:spLocks noGrp="1"/>
-          </p:cNvSpPr>
-          <p:nvPr>
-            <p:ph type="title"/>
-          </p:nvPr>
-        </p:nvSpPr>
-        <p:spPr/>
-        <p:txBody>
-          <a:bodyPr/>
-          <a:lstStyle/>
-          <a:p>
-            <a:r>
-              <a:rPr lang="en-US" dirty="0"/>
-              <a:t>Double Page Spread</a:t>
-            </a:r>
           </a:p>
         </p:txBody>
       </p:sp>
     </p:spTree>
     <p:extLst>
       <p:ext uri="{BB962C8B-B14F-4D97-AF65-F5344CB8AC3E}">
-        <p14:creationId xmlns:p14="http://schemas.microsoft.com/office/powerpoint/2010/main" val="4011389381"/>
+        <p14:creationId xmlns:p14="http://schemas.microsoft.com/office/powerpoint/2010/main" val="2006286489"/>
       </p:ext>
     </p:extLst>
   </p:cSld>
@@ -26612,6 +26426,958 @@
       </p:grpSpPr>
       <p:sp>
         <p:nvSpPr>
+          <p:cNvPr id="23" name="Picture Placeholder 22" descr="Picture Placeholder">
+            <a:extLst>
+              <a:ext uri="{FF2B5EF4-FFF2-40B4-BE49-F238E27FC236}">
+                <a16:creationId xmlns:a16="http://schemas.microsoft.com/office/drawing/2014/main" id="{44EA1915-6FC0-476B-AC04-2E258930701A}"/>
+              </a:ext>
+            </a:extLst>
+          </p:cNvPr>
+          <p:cNvSpPr>
+            <a:spLocks noGrp="1"/>
+          </p:cNvSpPr>
+          <p:nvPr>
+            <p:ph type="pic" sz="quarter" idx="28"/>
+          </p:nvPr>
+        </p:nvSpPr>
+        <p:spPr/>
+      </p:sp>
+      <p:sp>
+        <p:nvSpPr>
+          <p:cNvPr id="24" name="Picture Placeholder 23" descr="Picture Placeholder">
+            <a:extLst>
+              <a:ext uri="{FF2B5EF4-FFF2-40B4-BE49-F238E27FC236}">
+                <a16:creationId xmlns:a16="http://schemas.microsoft.com/office/drawing/2014/main" id="{81252996-4545-412A-84F8-FA4344D49EC4}"/>
+              </a:ext>
+            </a:extLst>
+          </p:cNvPr>
+          <p:cNvSpPr>
+            <a:spLocks noGrp="1"/>
+          </p:cNvSpPr>
+          <p:nvPr>
+            <p:ph type="pic" sz="quarter" idx="29"/>
+          </p:nvPr>
+        </p:nvSpPr>
+        <p:spPr/>
+      </p:sp>
+      <p:sp>
+        <p:nvSpPr>
+          <p:cNvPr id="25" name="Picture Placeholder 24" descr="Picture Placeholder">
+            <a:extLst>
+              <a:ext uri="{FF2B5EF4-FFF2-40B4-BE49-F238E27FC236}">
+                <a16:creationId xmlns:a16="http://schemas.microsoft.com/office/drawing/2014/main" id="{CB0C47AF-C809-44C7-B7B2-612D4477A6E9}"/>
+              </a:ext>
+            </a:extLst>
+          </p:cNvPr>
+          <p:cNvSpPr>
+            <a:spLocks noGrp="1"/>
+          </p:cNvSpPr>
+          <p:nvPr>
+            <p:ph type="pic" sz="quarter" idx="30"/>
+          </p:nvPr>
+        </p:nvSpPr>
+        <p:spPr/>
+      </p:sp>
+      <p:sp>
+        <p:nvSpPr>
+          <p:cNvPr id="26" name="Picture Placeholder 25" descr="Picture Placeholder">
+            <a:extLst>
+              <a:ext uri="{FF2B5EF4-FFF2-40B4-BE49-F238E27FC236}">
+                <a16:creationId xmlns:a16="http://schemas.microsoft.com/office/drawing/2014/main" id="{69F7AF10-C5CD-48D2-94BD-A25544617B87}"/>
+              </a:ext>
+            </a:extLst>
+          </p:cNvPr>
+          <p:cNvSpPr>
+            <a:spLocks noGrp="1"/>
+          </p:cNvSpPr>
+          <p:nvPr>
+            <p:ph type="pic" sz="quarter" idx="31"/>
+          </p:nvPr>
+        </p:nvSpPr>
+        <p:spPr/>
+      </p:sp>
+      <p:sp>
+        <p:nvSpPr>
+          <p:cNvPr id="27" name="Picture Placeholder 26" descr="Picture Placeholder">
+            <a:extLst>
+              <a:ext uri="{FF2B5EF4-FFF2-40B4-BE49-F238E27FC236}">
+                <a16:creationId xmlns:a16="http://schemas.microsoft.com/office/drawing/2014/main" id="{4F7D5399-C327-4381-BE35-69799D52B5AC}"/>
+              </a:ext>
+            </a:extLst>
+          </p:cNvPr>
+          <p:cNvSpPr>
+            <a:spLocks noGrp="1"/>
+          </p:cNvSpPr>
+          <p:nvPr>
+            <p:ph type="pic" sz="quarter" idx="32"/>
+          </p:nvPr>
+        </p:nvSpPr>
+        <p:spPr/>
+      </p:sp>
+      <p:sp>
+        <p:nvSpPr>
+          <p:cNvPr id="28" name="Picture Placeholder 27" descr="Picture Placeholder">
+            <a:extLst>
+              <a:ext uri="{FF2B5EF4-FFF2-40B4-BE49-F238E27FC236}">
+                <a16:creationId xmlns:a16="http://schemas.microsoft.com/office/drawing/2014/main" id="{18884CF6-61AC-467E-85E5-F371F81F98F1}"/>
+              </a:ext>
+            </a:extLst>
+          </p:cNvPr>
+          <p:cNvSpPr>
+            <a:spLocks noGrp="1"/>
+          </p:cNvSpPr>
+          <p:nvPr>
+            <p:ph type="pic" sz="quarter" idx="33"/>
+          </p:nvPr>
+        </p:nvSpPr>
+        <p:spPr/>
+      </p:sp>
+      <p:sp>
+        <p:nvSpPr>
+          <p:cNvPr id="29" name="Picture Placeholder 28" descr="Picture Placeholder">
+            <a:extLst>
+              <a:ext uri="{FF2B5EF4-FFF2-40B4-BE49-F238E27FC236}">
+                <a16:creationId xmlns:a16="http://schemas.microsoft.com/office/drawing/2014/main" id="{EFE901BE-8D68-41FC-B90E-B9F22E1A9472}"/>
+              </a:ext>
+            </a:extLst>
+          </p:cNvPr>
+          <p:cNvSpPr>
+            <a:spLocks noGrp="1"/>
+          </p:cNvSpPr>
+          <p:nvPr>
+            <p:ph type="pic" sz="quarter" idx="34"/>
+          </p:nvPr>
+        </p:nvSpPr>
+        <p:spPr/>
+      </p:sp>
+      <p:sp>
+        <p:nvSpPr>
+          <p:cNvPr id="9" name="Text Placeholder 8">
+            <a:extLst>
+              <a:ext uri="{FF2B5EF4-FFF2-40B4-BE49-F238E27FC236}">
+                <a16:creationId xmlns:a16="http://schemas.microsoft.com/office/drawing/2014/main" id="{1DBCBD81-84AA-4C64-B379-E0D9268ACF2C}"/>
+              </a:ext>
+            </a:extLst>
+          </p:cNvPr>
+          <p:cNvSpPr>
+            <a:spLocks noGrp="1"/>
+          </p:cNvSpPr>
+          <p:nvPr>
+            <p:ph type="body" sz="quarter" idx="23"/>
+          </p:nvPr>
+        </p:nvSpPr>
+        <p:spPr/>
+        <p:txBody>
+          <a:bodyPr/>
+          <a:lstStyle/>
+          <a:p>
+            <a:r>
+              <a:rPr lang="en-US" dirty="0"/>
+              <a:t>Place your photo caption here</a:t>
+            </a:r>
+          </a:p>
+        </p:txBody>
+      </p:sp>
+      <p:sp>
+        <p:nvSpPr>
+          <p:cNvPr id="10" name="Text Placeholder 9">
+            <a:extLst>
+              <a:ext uri="{FF2B5EF4-FFF2-40B4-BE49-F238E27FC236}">
+                <a16:creationId xmlns:a16="http://schemas.microsoft.com/office/drawing/2014/main" id="{807E6B10-8E32-44D4-ABBF-4A9B0DA6FF0C}"/>
+              </a:ext>
+            </a:extLst>
+          </p:cNvPr>
+          <p:cNvSpPr>
+            <a:spLocks noGrp="1"/>
+          </p:cNvSpPr>
+          <p:nvPr>
+            <p:ph type="body" sz="quarter" idx="25"/>
+          </p:nvPr>
+        </p:nvSpPr>
+        <p:spPr/>
+        <p:txBody>
+          <a:bodyPr/>
+          <a:lstStyle/>
+          <a:p>
+            <a:r>
+              <a:rPr lang="en-US" dirty="0"/>
+              <a:t>Place your photo caption here</a:t>
+            </a:r>
+          </a:p>
+        </p:txBody>
+      </p:sp>
+      <p:sp>
+        <p:nvSpPr>
+          <p:cNvPr id="11" name="Slide Number Placeholder 10">
+            <a:extLst>
+              <a:ext uri="{FF2B5EF4-FFF2-40B4-BE49-F238E27FC236}">
+                <a16:creationId xmlns:a16="http://schemas.microsoft.com/office/drawing/2014/main" id="{C68DE40A-9965-4C65-9A56-313164F7C81B}"/>
+              </a:ext>
+            </a:extLst>
+          </p:cNvPr>
+          <p:cNvSpPr>
+            <a:spLocks noGrp="1"/>
+          </p:cNvSpPr>
+          <p:nvPr>
+            <p:ph type="sldNum" sz="quarter" idx="11"/>
+          </p:nvPr>
+        </p:nvSpPr>
+        <p:spPr/>
+        <p:txBody>
+          <a:bodyPr/>
+          <a:lstStyle/>
+          <a:p>
+            <a:fld id="{26699011-AD31-4C1E-9097-A1CA72DD0DA4}" type="slidenum">
+              <a:rPr lang="en-US" smtClean="0"/>
+              <a:pPr/>
+              <a:t>13</a:t>
+            </a:fld>
+            <a:endParaRPr lang="en-US" dirty="0"/>
+          </a:p>
+        </p:txBody>
+      </p:sp>
+      <p:sp>
+        <p:nvSpPr>
+          <p:cNvPr id="12" name="Title 11">
+            <a:extLst>
+              <a:ext uri="{FF2B5EF4-FFF2-40B4-BE49-F238E27FC236}">
+                <a16:creationId xmlns:a16="http://schemas.microsoft.com/office/drawing/2014/main" id="{FA3C2A35-5068-4B1A-8492-772F61018F36}"/>
+              </a:ext>
+            </a:extLst>
+          </p:cNvPr>
+          <p:cNvSpPr>
+            <a:spLocks noGrp="1"/>
+          </p:cNvSpPr>
+          <p:nvPr>
+            <p:ph type="title"/>
+          </p:nvPr>
+        </p:nvSpPr>
+        <p:spPr/>
+        <p:txBody>
+          <a:bodyPr/>
+          <a:lstStyle/>
+          <a:p>
+            <a:r>
+              <a:rPr lang="en-US" dirty="0"/>
+              <a:t>Variety Slide Title</a:t>
+            </a:r>
+          </a:p>
+        </p:txBody>
+      </p:sp>
+      <p:sp>
+        <p:nvSpPr>
+          <p:cNvPr id="13" name="Text Placeholder 12">
+            <a:extLst>
+              <a:ext uri="{FF2B5EF4-FFF2-40B4-BE49-F238E27FC236}">
+                <a16:creationId xmlns:a16="http://schemas.microsoft.com/office/drawing/2014/main" id="{8475990A-5D82-44A0-A5CE-D0E8711F1DCA}"/>
+              </a:ext>
+            </a:extLst>
+          </p:cNvPr>
+          <p:cNvSpPr>
+            <a:spLocks noGrp="1"/>
+          </p:cNvSpPr>
+          <p:nvPr>
+            <p:ph type="body" sz="quarter" idx="26"/>
+          </p:nvPr>
+        </p:nvSpPr>
+        <p:spPr/>
+        <p:txBody>
+          <a:bodyPr/>
+          <a:lstStyle/>
+          <a:p>
+            <a:r>
+              <a:rPr lang="en-US" dirty="0"/>
+              <a:t>Place your photo caption here</a:t>
+            </a:r>
+          </a:p>
+        </p:txBody>
+      </p:sp>
+      <p:sp>
+        <p:nvSpPr>
+          <p:cNvPr id="14" name="Text Placeholder 13">
+            <a:extLst>
+              <a:ext uri="{FF2B5EF4-FFF2-40B4-BE49-F238E27FC236}">
+                <a16:creationId xmlns:a16="http://schemas.microsoft.com/office/drawing/2014/main" id="{CFD8BFB8-0EE2-4F8A-9289-B7E356E8B984}"/>
+              </a:ext>
+            </a:extLst>
+          </p:cNvPr>
+          <p:cNvSpPr>
+            <a:spLocks noGrp="1"/>
+          </p:cNvSpPr>
+          <p:nvPr>
+            <p:ph type="body" sz="quarter" idx="27"/>
+          </p:nvPr>
+        </p:nvSpPr>
+        <p:spPr/>
+        <p:txBody>
+          <a:bodyPr/>
+          <a:lstStyle/>
+          <a:p>
+            <a:r>
+              <a:rPr lang="en-US" dirty="0"/>
+              <a:t>BADGE TEXT</a:t>
+            </a:r>
+          </a:p>
+        </p:txBody>
+      </p:sp>
+    </p:spTree>
+    <p:extLst>
+      <p:ext uri="{BB962C8B-B14F-4D97-AF65-F5344CB8AC3E}">
+        <p14:creationId xmlns:p14="http://schemas.microsoft.com/office/powerpoint/2010/main" val="2299681795"/>
+      </p:ext>
+    </p:extLst>
+  </p:cSld>
+  <p:clrMapOvr>
+    <a:masterClrMapping/>
+  </p:clrMapOvr>
+</p:sld>
+</file>
+
+<file path=ppt/slides/slide14.xml><?xml version="1.0" encoding="utf-8"?>
+<p:sld xmlns:a="http://schemas.openxmlformats.org/drawingml/2006/main" xmlns:r="http://schemas.openxmlformats.org/officeDocument/2006/relationships" xmlns:p="http://schemas.openxmlformats.org/presentationml/2006/main">
+  <p:cSld>
+    <p:spTree>
+      <p:nvGrpSpPr>
+        <p:cNvPr id="1" name=""/>
+        <p:cNvGrpSpPr/>
+        <p:nvPr/>
+      </p:nvGrpSpPr>
+      <p:grpSpPr>
+        <a:xfrm>
+          <a:off x="0" y="0"/>
+          <a:ext cx="0" cy="0"/>
+          <a:chOff x="0" y="0"/>
+          <a:chExt cx="0" cy="0"/>
+        </a:xfrm>
+      </p:grpSpPr>
+      <p:sp>
+        <p:nvSpPr>
+          <p:cNvPr id="16" name="Text Placeholder 15">
+            <a:extLst>
+              <a:ext uri="{FF2B5EF4-FFF2-40B4-BE49-F238E27FC236}">
+                <a16:creationId xmlns:a16="http://schemas.microsoft.com/office/drawing/2014/main" id="{9AB7D099-5143-4858-9512-5E1FA28E3DE0}"/>
+              </a:ext>
+            </a:extLst>
+          </p:cNvPr>
+          <p:cNvSpPr>
+            <a:spLocks noGrp="1"/>
+          </p:cNvSpPr>
+          <p:nvPr>
+            <p:ph type="body" sz="quarter" idx="23"/>
+          </p:nvPr>
+        </p:nvSpPr>
+        <p:spPr/>
+        <p:txBody>
+          <a:bodyPr/>
+          <a:lstStyle/>
+          <a:p>
+            <a:r>
+              <a:rPr lang="en-US" dirty="0"/>
+              <a:t>Place your photo caption here</a:t>
+            </a:r>
+          </a:p>
+        </p:txBody>
+      </p:sp>
+      <p:sp>
+        <p:nvSpPr>
+          <p:cNvPr id="18" name="Text Placeholder 17">
+            <a:extLst>
+              <a:ext uri="{FF2B5EF4-FFF2-40B4-BE49-F238E27FC236}">
+                <a16:creationId xmlns:a16="http://schemas.microsoft.com/office/drawing/2014/main" id="{E7911E24-BB7A-4A72-8A10-7F3E8D0FEE10}"/>
+              </a:ext>
+            </a:extLst>
+          </p:cNvPr>
+          <p:cNvSpPr>
+            <a:spLocks noGrp="1"/>
+          </p:cNvSpPr>
+          <p:nvPr>
+            <p:ph type="body" sz="quarter" idx="26"/>
+          </p:nvPr>
+        </p:nvSpPr>
+        <p:spPr/>
+        <p:txBody>
+          <a:bodyPr/>
+          <a:lstStyle/>
+          <a:p>
+            <a:r>
+              <a:rPr lang="en-US" dirty="0"/>
+              <a:t>Place your photo caption here</a:t>
+            </a:r>
+          </a:p>
+        </p:txBody>
+      </p:sp>
+      <p:sp>
+        <p:nvSpPr>
+          <p:cNvPr id="17" name="Text Placeholder 16">
+            <a:extLst>
+              <a:ext uri="{FF2B5EF4-FFF2-40B4-BE49-F238E27FC236}">
+                <a16:creationId xmlns:a16="http://schemas.microsoft.com/office/drawing/2014/main" id="{EC94C758-0E7E-44CA-8258-2DB8C357D544}"/>
+              </a:ext>
+            </a:extLst>
+          </p:cNvPr>
+          <p:cNvSpPr>
+            <a:spLocks noGrp="1"/>
+          </p:cNvSpPr>
+          <p:nvPr>
+            <p:ph type="body" sz="quarter" idx="25"/>
+          </p:nvPr>
+        </p:nvSpPr>
+        <p:spPr/>
+        <p:txBody>
+          <a:bodyPr/>
+          <a:lstStyle/>
+          <a:p>
+            <a:r>
+              <a:rPr lang="en-US" dirty="0"/>
+              <a:t>Place your photo caption here</a:t>
+            </a:r>
+          </a:p>
+        </p:txBody>
+      </p:sp>
+      <p:sp>
+        <p:nvSpPr>
+          <p:cNvPr id="21" name="Picture Placeholder 20" descr="Picture Placeholder">
+            <a:extLst>
+              <a:ext uri="{FF2B5EF4-FFF2-40B4-BE49-F238E27FC236}">
+                <a16:creationId xmlns:a16="http://schemas.microsoft.com/office/drawing/2014/main" id="{BCCBADBF-CD83-489F-9386-F919EFF1BA00}"/>
+              </a:ext>
+            </a:extLst>
+          </p:cNvPr>
+          <p:cNvSpPr>
+            <a:spLocks noGrp="1"/>
+          </p:cNvSpPr>
+          <p:nvPr>
+            <p:ph type="pic" sz="quarter" idx="29"/>
+          </p:nvPr>
+        </p:nvSpPr>
+        <p:spPr/>
+      </p:sp>
+      <p:sp>
+        <p:nvSpPr>
+          <p:cNvPr id="23" name="Picture Placeholder 22" descr="Picture Placeholder">
+            <a:extLst>
+              <a:ext uri="{FF2B5EF4-FFF2-40B4-BE49-F238E27FC236}">
+                <a16:creationId xmlns:a16="http://schemas.microsoft.com/office/drawing/2014/main" id="{0405EAF9-AD97-4605-82B8-561E3E5E06A6}"/>
+              </a:ext>
+            </a:extLst>
+          </p:cNvPr>
+          <p:cNvSpPr>
+            <a:spLocks noGrp="1"/>
+          </p:cNvSpPr>
+          <p:nvPr>
+            <p:ph type="pic" sz="quarter" idx="31"/>
+          </p:nvPr>
+        </p:nvSpPr>
+        <p:spPr/>
+      </p:sp>
+      <p:sp>
+        <p:nvSpPr>
+          <p:cNvPr id="25" name="Picture Placeholder 24" descr="Picture Placeholder">
+            <a:extLst>
+              <a:ext uri="{FF2B5EF4-FFF2-40B4-BE49-F238E27FC236}">
+                <a16:creationId xmlns:a16="http://schemas.microsoft.com/office/drawing/2014/main" id="{3C5CA835-9D6A-474A-8BE2-1EE6651D266F}"/>
+              </a:ext>
+            </a:extLst>
+          </p:cNvPr>
+          <p:cNvSpPr>
+            <a:spLocks noGrp="1"/>
+          </p:cNvSpPr>
+          <p:nvPr>
+            <p:ph type="pic" sz="quarter" idx="34"/>
+          </p:nvPr>
+        </p:nvSpPr>
+        <p:spPr/>
+      </p:sp>
+      <p:sp>
+        <p:nvSpPr>
+          <p:cNvPr id="24" name="Picture Placeholder 23" descr="Picture Placeholder">
+            <a:extLst>
+              <a:ext uri="{FF2B5EF4-FFF2-40B4-BE49-F238E27FC236}">
+                <a16:creationId xmlns:a16="http://schemas.microsoft.com/office/drawing/2014/main" id="{F59C24B6-4C8C-4212-89FC-8DB10A4E5F24}"/>
+              </a:ext>
+            </a:extLst>
+          </p:cNvPr>
+          <p:cNvSpPr>
+            <a:spLocks noGrp="1"/>
+          </p:cNvSpPr>
+          <p:nvPr>
+            <p:ph type="pic" sz="quarter" idx="32"/>
+          </p:nvPr>
+        </p:nvSpPr>
+        <p:spPr/>
+      </p:sp>
+      <p:sp>
+        <p:nvSpPr>
+          <p:cNvPr id="20" name="Picture Placeholder 19" descr="Picture Placeholder">
+            <a:extLst>
+              <a:ext uri="{FF2B5EF4-FFF2-40B4-BE49-F238E27FC236}">
+                <a16:creationId xmlns:a16="http://schemas.microsoft.com/office/drawing/2014/main" id="{A75316D0-71EB-49B3-8C05-2796276317CB}"/>
+              </a:ext>
+            </a:extLst>
+          </p:cNvPr>
+          <p:cNvSpPr>
+            <a:spLocks noGrp="1"/>
+          </p:cNvSpPr>
+          <p:nvPr>
+            <p:ph type="pic" sz="quarter" idx="28"/>
+          </p:nvPr>
+        </p:nvSpPr>
+        <p:spPr/>
+      </p:sp>
+      <p:sp>
+        <p:nvSpPr>
+          <p:cNvPr id="22" name="Picture Placeholder 21" descr="Picture Placeholder">
+            <a:extLst>
+              <a:ext uri="{FF2B5EF4-FFF2-40B4-BE49-F238E27FC236}">
+                <a16:creationId xmlns:a16="http://schemas.microsoft.com/office/drawing/2014/main" id="{FC8CE03B-7514-40C6-9AAE-72F72D180909}"/>
+              </a:ext>
+            </a:extLst>
+          </p:cNvPr>
+          <p:cNvSpPr>
+            <a:spLocks noGrp="1"/>
+          </p:cNvSpPr>
+          <p:nvPr>
+            <p:ph type="pic" sz="quarter" idx="30"/>
+          </p:nvPr>
+        </p:nvSpPr>
+        <p:spPr/>
+      </p:sp>
+      <p:sp>
+        <p:nvSpPr>
+          <p:cNvPr id="12" name="Slide Number Placeholder 11">
+            <a:extLst>
+              <a:ext uri="{FF2B5EF4-FFF2-40B4-BE49-F238E27FC236}">
+                <a16:creationId xmlns:a16="http://schemas.microsoft.com/office/drawing/2014/main" id="{52702D28-3072-4358-B0D1-3F20E90EECD3}"/>
+              </a:ext>
+            </a:extLst>
+          </p:cNvPr>
+          <p:cNvSpPr>
+            <a:spLocks noGrp="1"/>
+          </p:cNvSpPr>
+          <p:nvPr>
+            <p:ph type="sldNum" sz="quarter" idx="11"/>
+          </p:nvPr>
+        </p:nvSpPr>
+        <p:spPr/>
+        <p:txBody>
+          <a:bodyPr/>
+          <a:lstStyle/>
+          <a:p>
+            <a:fld id="{26699011-AD31-4C1E-9097-A1CA72DD0DA4}" type="slidenum">
+              <a:rPr lang="en-US" smtClean="0"/>
+              <a:pPr/>
+              <a:t>14</a:t>
+            </a:fld>
+            <a:endParaRPr lang="en-US" dirty="0"/>
+          </a:p>
+        </p:txBody>
+      </p:sp>
+      <p:sp>
+        <p:nvSpPr>
+          <p:cNvPr id="15" name="Title 14">
+            <a:extLst>
+              <a:ext uri="{FF2B5EF4-FFF2-40B4-BE49-F238E27FC236}">
+                <a16:creationId xmlns:a16="http://schemas.microsoft.com/office/drawing/2014/main" id="{B92F51A5-0461-4206-9A23-2C02EA7C8E8A}"/>
+              </a:ext>
+            </a:extLst>
+          </p:cNvPr>
+          <p:cNvSpPr>
+            <a:spLocks noGrp="1"/>
+          </p:cNvSpPr>
+          <p:nvPr>
+            <p:ph type="title"/>
+          </p:nvPr>
+        </p:nvSpPr>
+        <p:spPr/>
+        <p:txBody>
+          <a:bodyPr/>
+          <a:lstStyle/>
+          <a:p>
+            <a:r>
+              <a:rPr lang="en-US" dirty="0"/>
+              <a:t>Variety Slide Title</a:t>
+            </a:r>
+          </a:p>
+        </p:txBody>
+      </p:sp>
+      <p:sp>
+        <p:nvSpPr>
+          <p:cNvPr id="19" name="Text Placeholder 18">
+            <a:extLst>
+              <a:ext uri="{FF2B5EF4-FFF2-40B4-BE49-F238E27FC236}">
+                <a16:creationId xmlns:a16="http://schemas.microsoft.com/office/drawing/2014/main" id="{494EEBF9-D95A-4AFE-B261-70BDCA07FAF3}"/>
+              </a:ext>
+            </a:extLst>
+          </p:cNvPr>
+          <p:cNvSpPr>
+            <a:spLocks noGrp="1"/>
+          </p:cNvSpPr>
+          <p:nvPr>
+            <p:ph type="body" sz="quarter" idx="27"/>
+          </p:nvPr>
+        </p:nvSpPr>
+        <p:spPr/>
+        <p:txBody>
+          <a:bodyPr/>
+          <a:lstStyle/>
+          <a:p>
+            <a:r>
+              <a:rPr lang="en-US" dirty="0"/>
+              <a:t>BADGE TEXT</a:t>
+            </a:r>
+          </a:p>
+        </p:txBody>
+      </p:sp>
+    </p:spTree>
+    <p:extLst>
+      <p:ext uri="{BB962C8B-B14F-4D97-AF65-F5344CB8AC3E}">
+        <p14:creationId xmlns:p14="http://schemas.microsoft.com/office/powerpoint/2010/main" val="441278867"/>
+      </p:ext>
+    </p:extLst>
+  </p:cSld>
+  <p:clrMapOvr>
+    <a:masterClrMapping/>
+  </p:clrMapOvr>
+</p:sld>
+</file>
+
+<file path=ppt/slides/slide15.xml><?xml version="1.0" encoding="utf-8"?>
+<p:sld xmlns:a="http://schemas.openxmlformats.org/drawingml/2006/main" xmlns:r="http://schemas.openxmlformats.org/officeDocument/2006/relationships" xmlns:p="http://schemas.openxmlformats.org/presentationml/2006/main">
+  <p:cSld>
+    <p:spTree>
+      <p:nvGrpSpPr>
+        <p:cNvPr id="1" name=""/>
+        <p:cNvGrpSpPr/>
+        <p:nvPr/>
+      </p:nvGrpSpPr>
+      <p:grpSpPr>
+        <a:xfrm>
+          <a:off x="0" y="0"/>
+          <a:ext cx="0" cy="0"/>
+          <a:chOff x="0" y="0"/>
+          <a:chExt cx="0" cy="0"/>
+        </a:xfrm>
+      </p:grpSpPr>
+      <p:sp>
+        <p:nvSpPr>
+          <p:cNvPr id="10" name="Text Placeholder 9">
+            <a:extLst>
+              <a:ext uri="{FF2B5EF4-FFF2-40B4-BE49-F238E27FC236}">
+                <a16:creationId xmlns:a16="http://schemas.microsoft.com/office/drawing/2014/main" id="{519DF788-4FF7-4948-89FE-77EAB056C847}"/>
+              </a:ext>
+            </a:extLst>
+          </p:cNvPr>
+          <p:cNvSpPr>
+            <a:spLocks noGrp="1"/>
+          </p:cNvSpPr>
+          <p:nvPr>
+            <p:ph type="body" sz="quarter" idx="25"/>
+          </p:nvPr>
+        </p:nvSpPr>
+        <p:spPr/>
+        <p:txBody>
+          <a:bodyPr/>
+          <a:lstStyle/>
+          <a:p>
+            <a:r>
+              <a:rPr lang="en-US" dirty="0"/>
+              <a:t>Place your photo caption here</a:t>
+            </a:r>
+          </a:p>
+        </p:txBody>
+      </p:sp>
+      <p:sp>
+        <p:nvSpPr>
+          <p:cNvPr id="14" name="Picture Placeholder 13" descr="Picture Placeholder">
+            <a:extLst>
+              <a:ext uri="{FF2B5EF4-FFF2-40B4-BE49-F238E27FC236}">
+                <a16:creationId xmlns:a16="http://schemas.microsoft.com/office/drawing/2014/main" id="{BE681F5F-8E34-45D0-804F-ADB8B7792213}"/>
+              </a:ext>
+            </a:extLst>
+          </p:cNvPr>
+          <p:cNvSpPr>
+            <a:spLocks noGrp="1"/>
+          </p:cNvSpPr>
+          <p:nvPr>
+            <p:ph type="pic" sz="quarter" idx="29"/>
+          </p:nvPr>
+        </p:nvSpPr>
+        <p:spPr/>
+      </p:sp>
+      <p:sp>
+        <p:nvSpPr>
+          <p:cNvPr id="15" name="Picture Placeholder 14" descr="Picture Placeholder">
+            <a:extLst>
+              <a:ext uri="{FF2B5EF4-FFF2-40B4-BE49-F238E27FC236}">
+                <a16:creationId xmlns:a16="http://schemas.microsoft.com/office/drawing/2014/main" id="{70CF1D92-F14C-47CF-B09E-5338176C9224}"/>
+              </a:ext>
+            </a:extLst>
+          </p:cNvPr>
+          <p:cNvSpPr>
+            <a:spLocks noGrp="1"/>
+          </p:cNvSpPr>
+          <p:nvPr>
+            <p:ph type="pic" sz="quarter" idx="30"/>
+          </p:nvPr>
+        </p:nvSpPr>
+        <p:spPr/>
+      </p:sp>
+      <p:sp>
+        <p:nvSpPr>
+          <p:cNvPr id="16" name="Picture Placeholder 15" descr="Picture Placeholder">
+            <a:extLst>
+              <a:ext uri="{FF2B5EF4-FFF2-40B4-BE49-F238E27FC236}">
+                <a16:creationId xmlns:a16="http://schemas.microsoft.com/office/drawing/2014/main" id="{9A2DED56-7966-437B-9BBD-F392C6D9A0A1}"/>
+              </a:ext>
+            </a:extLst>
+          </p:cNvPr>
+          <p:cNvSpPr>
+            <a:spLocks noGrp="1"/>
+          </p:cNvSpPr>
+          <p:nvPr>
+            <p:ph type="pic" sz="quarter" idx="31"/>
+          </p:nvPr>
+        </p:nvSpPr>
+        <p:spPr/>
+      </p:sp>
+      <p:sp>
+        <p:nvSpPr>
+          <p:cNvPr id="17" name="Picture Placeholder 16" descr="Picture Placeholder">
+            <a:extLst>
+              <a:ext uri="{FF2B5EF4-FFF2-40B4-BE49-F238E27FC236}">
+                <a16:creationId xmlns:a16="http://schemas.microsoft.com/office/drawing/2014/main" id="{E413CE35-E99B-4675-9298-159AA851BDD6}"/>
+              </a:ext>
+            </a:extLst>
+          </p:cNvPr>
+          <p:cNvSpPr>
+            <a:spLocks noGrp="1"/>
+          </p:cNvSpPr>
+          <p:nvPr>
+            <p:ph type="pic" sz="quarter" idx="32"/>
+          </p:nvPr>
+        </p:nvSpPr>
+        <p:spPr/>
+      </p:sp>
+      <p:sp>
+        <p:nvSpPr>
+          <p:cNvPr id="18" name="Picture Placeholder 17" descr="Picture Placeholder">
+            <a:extLst>
+              <a:ext uri="{FF2B5EF4-FFF2-40B4-BE49-F238E27FC236}">
+                <a16:creationId xmlns:a16="http://schemas.microsoft.com/office/drawing/2014/main" id="{54482BF7-728B-48BB-9A7A-30788D375384}"/>
+              </a:ext>
+            </a:extLst>
+          </p:cNvPr>
+          <p:cNvSpPr>
+            <a:spLocks noGrp="1"/>
+          </p:cNvSpPr>
+          <p:nvPr>
+            <p:ph type="pic" sz="quarter" idx="33"/>
+          </p:nvPr>
+        </p:nvSpPr>
+        <p:spPr/>
+      </p:sp>
+      <p:sp>
+        <p:nvSpPr>
+          <p:cNvPr id="13" name="Text Placeholder 12">
+            <a:extLst>
+              <a:ext uri="{FF2B5EF4-FFF2-40B4-BE49-F238E27FC236}">
+                <a16:creationId xmlns:a16="http://schemas.microsoft.com/office/drawing/2014/main" id="{D9CC906F-B634-423C-9900-86A07F935905}"/>
+              </a:ext>
+            </a:extLst>
+          </p:cNvPr>
+          <p:cNvSpPr>
+            <a:spLocks noGrp="1"/>
+          </p:cNvSpPr>
+          <p:nvPr>
+            <p:ph type="body" sz="quarter" idx="28"/>
+          </p:nvPr>
+        </p:nvSpPr>
+        <p:spPr/>
+        <p:txBody>
+          <a:bodyPr/>
+          <a:lstStyle/>
+          <a:p>
+            <a:r>
+              <a:rPr lang="en-US" dirty="0"/>
+              <a:t>BADGE TEXT</a:t>
+            </a:r>
+          </a:p>
+        </p:txBody>
+      </p:sp>
+      <p:sp>
+        <p:nvSpPr>
+          <p:cNvPr id="11" name="Text Placeholder 10">
+            <a:extLst>
+              <a:ext uri="{FF2B5EF4-FFF2-40B4-BE49-F238E27FC236}">
+                <a16:creationId xmlns:a16="http://schemas.microsoft.com/office/drawing/2014/main" id="{B887DAA9-CC06-4747-8C68-ACE468BF0FF3}"/>
+              </a:ext>
+            </a:extLst>
+          </p:cNvPr>
+          <p:cNvSpPr>
+            <a:spLocks noGrp="1"/>
+          </p:cNvSpPr>
+          <p:nvPr>
+            <p:ph type="body" sz="quarter" idx="26"/>
+          </p:nvPr>
+        </p:nvSpPr>
+        <p:spPr/>
+        <p:txBody>
+          <a:bodyPr/>
+          <a:lstStyle/>
+          <a:p>
+            <a:r>
+              <a:rPr lang="en-US" dirty="0"/>
+              <a:t>Place your photo caption here</a:t>
+            </a:r>
+          </a:p>
+        </p:txBody>
+      </p:sp>
+      <p:sp>
+        <p:nvSpPr>
+          <p:cNvPr id="9" name="Text Placeholder 8">
+            <a:extLst>
+              <a:ext uri="{FF2B5EF4-FFF2-40B4-BE49-F238E27FC236}">
+                <a16:creationId xmlns:a16="http://schemas.microsoft.com/office/drawing/2014/main" id="{899B43A3-504D-44F5-A22A-9627D2C19827}"/>
+              </a:ext>
+            </a:extLst>
+          </p:cNvPr>
+          <p:cNvSpPr>
+            <a:spLocks noGrp="1"/>
+          </p:cNvSpPr>
+          <p:nvPr>
+            <p:ph type="body" sz="quarter" idx="23"/>
+          </p:nvPr>
+        </p:nvSpPr>
+        <p:spPr/>
+        <p:txBody>
+          <a:bodyPr/>
+          <a:lstStyle/>
+          <a:p>
+            <a:r>
+              <a:rPr lang="en-US" dirty="0"/>
+              <a:t>Place your photo caption here</a:t>
+            </a:r>
+          </a:p>
+        </p:txBody>
+      </p:sp>
+      <p:sp>
+        <p:nvSpPr>
+          <p:cNvPr id="12" name="Text Placeholder 11">
+            <a:extLst>
+              <a:ext uri="{FF2B5EF4-FFF2-40B4-BE49-F238E27FC236}">
+                <a16:creationId xmlns:a16="http://schemas.microsoft.com/office/drawing/2014/main" id="{1A6375B8-230B-4993-A0F4-C2D3C0628E22}"/>
+              </a:ext>
+            </a:extLst>
+          </p:cNvPr>
+          <p:cNvSpPr>
+            <a:spLocks noGrp="1"/>
+          </p:cNvSpPr>
+          <p:nvPr>
+            <p:ph type="body" sz="quarter" idx="27"/>
+          </p:nvPr>
+        </p:nvSpPr>
+        <p:spPr/>
+        <p:txBody>
+          <a:bodyPr/>
+          <a:lstStyle/>
+          <a:p>
+            <a:r>
+              <a:rPr lang="en-US" dirty="0"/>
+              <a:t>Place your photo caption here</a:t>
+            </a:r>
+          </a:p>
+        </p:txBody>
+      </p:sp>
+      <p:sp>
+        <p:nvSpPr>
+          <p:cNvPr id="4" name="Slide Number Placeholder 3">
+            <a:extLst>
+              <a:ext uri="{FF2B5EF4-FFF2-40B4-BE49-F238E27FC236}">
+                <a16:creationId xmlns:a16="http://schemas.microsoft.com/office/drawing/2014/main" id="{904A7568-1FD6-4570-92EE-2EF5E9DE3FAF}"/>
+              </a:ext>
+            </a:extLst>
+          </p:cNvPr>
+          <p:cNvSpPr>
+            <a:spLocks noGrp="1"/>
+          </p:cNvSpPr>
+          <p:nvPr>
+            <p:ph type="sldNum" sz="quarter" idx="11"/>
+          </p:nvPr>
+        </p:nvSpPr>
+        <p:spPr/>
+        <p:txBody>
+          <a:bodyPr/>
+          <a:lstStyle/>
+          <a:p>
+            <a:fld id="{26699011-AD31-4C1E-9097-A1CA72DD0DA4}" type="slidenum">
+              <a:rPr lang="en-US" smtClean="0"/>
+              <a:pPr/>
+              <a:t>15</a:t>
+            </a:fld>
+            <a:endParaRPr lang="en-US" dirty="0"/>
+          </a:p>
+        </p:txBody>
+      </p:sp>
+      <p:sp>
+        <p:nvSpPr>
+          <p:cNvPr id="8" name="Title 7">
+            <a:extLst>
+              <a:ext uri="{FF2B5EF4-FFF2-40B4-BE49-F238E27FC236}">
+                <a16:creationId xmlns:a16="http://schemas.microsoft.com/office/drawing/2014/main" id="{7E1A6561-3F7B-4658-A1EF-FCA8AB6A9CAC}"/>
+              </a:ext>
+            </a:extLst>
+          </p:cNvPr>
+          <p:cNvSpPr>
+            <a:spLocks noGrp="1"/>
+          </p:cNvSpPr>
+          <p:nvPr>
+            <p:ph type="title"/>
+          </p:nvPr>
+        </p:nvSpPr>
+        <p:spPr/>
+        <p:txBody>
+          <a:bodyPr/>
+          <a:lstStyle/>
+          <a:p>
+            <a:r>
+              <a:rPr lang="en-US" dirty="0"/>
+              <a:t>Double Page Spread</a:t>
+            </a:r>
+          </a:p>
+        </p:txBody>
+      </p:sp>
+    </p:spTree>
+    <p:extLst>
+      <p:ext uri="{BB962C8B-B14F-4D97-AF65-F5344CB8AC3E}">
+        <p14:creationId xmlns:p14="http://schemas.microsoft.com/office/powerpoint/2010/main" val="4011389381"/>
+      </p:ext>
+    </p:extLst>
+  </p:cSld>
+  <p:clrMapOvr>
+    <a:masterClrMapping/>
+  </p:clrMapOvr>
+</p:sld>
+</file>
+
+<file path=ppt/slides/slide16.xml><?xml version="1.0" encoding="utf-8"?>
+<p:sld xmlns:a="http://schemas.openxmlformats.org/drawingml/2006/main" xmlns:r="http://schemas.openxmlformats.org/officeDocument/2006/relationships" xmlns:p="http://schemas.openxmlformats.org/presentationml/2006/main">
+  <p:cSld>
+    <p:spTree>
+      <p:nvGrpSpPr>
+        <p:cNvPr id="1" name=""/>
+        <p:cNvGrpSpPr/>
+        <p:nvPr/>
+      </p:nvGrpSpPr>
+      <p:grpSpPr>
+        <a:xfrm>
+          <a:off x="0" y="0"/>
+          <a:ext cx="0" cy="0"/>
+          <a:chOff x="0" y="0"/>
+          <a:chExt cx="0" cy="0"/>
+        </a:xfrm>
+      </p:grpSpPr>
+      <p:sp>
+        <p:nvSpPr>
           <p:cNvPr id="6" name="Text Placeholder 5">
             <a:extLst>
               <a:ext uri="{FF2B5EF4-FFF2-40B4-BE49-F238E27FC236}">
@@ -26690,7 +27456,7 @@
             <a:fld id="{26699011-AD31-4C1E-9097-A1CA72DD0DA4}" type="slidenum">
               <a:rPr lang="en-US" smtClean="0"/>
               <a:pPr/>
-              <a:t>13</a:t>
+              <a:t>16</a:t>
             </a:fld>
             <a:endParaRPr lang="en-US" dirty="0"/>
           </a:p>
@@ -27080,7 +27846,7 @@
 </p:sld>
 </file>
 
-<file path=ppt/slides/slide14.xml><?xml version="1.0" encoding="utf-8"?>
+<file path=ppt/slides/slide17.xml><?xml version="1.0" encoding="utf-8"?>
 <p:sld xmlns:a="http://schemas.openxmlformats.org/drawingml/2006/main" xmlns:r="http://schemas.openxmlformats.org/officeDocument/2006/relationships" xmlns:p="http://schemas.openxmlformats.org/presentationml/2006/main">
   <p:cSld>
     <p:spTree>
@@ -27120,7 +27886,7 @@
           <a:p>
             <a:fld id="{26699011-AD31-4C1E-9097-A1CA72DD0DA4}" type="slidenum">
               <a:rPr lang="en-US" smtClean="0"/>
-              <a:t>14</a:t>
+              <a:t>17</a:t>
             </a:fld>
             <a:endParaRPr lang="en-US" dirty="0"/>
           </a:p>
@@ -27185,7 +27951,7 @@
 </p:sld>
 </file>
 
-<file path=ppt/slides/slide15.xml><?xml version="1.0" encoding="utf-8"?>
+<file path=ppt/slides/slide18.xml><?xml version="1.0" encoding="utf-8"?>
 <p:sld xmlns:a="http://schemas.openxmlformats.org/drawingml/2006/main" xmlns:r="http://schemas.openxmlformats.org/officeDocument/2006/relationships" xmlns:p="http://schemas.openxmlformats.org/presentationml/2006/main">
   <p:cSld>
     <p:spTree>
@@ -27859,65 +28625,6 @@
           <a:chExt cx="0" cy="0"/>
         </a:xfrm>
       </p:grpSpPr>
-      <p:pic>
-        <p:nvPicPr>
-          <p:cNvPr id="7" name="Picture 6">
-            <a:extLst>
-              <a:ext uri="{FF2B5EF4-FFF2-40B4-BE49-F238E27FC236}">
-                <a16:creationId xmlns:a16="http://schemas.microsoft.com/office/drawing/2014/main" id="{0294B487-7659-3142-A81F-CC42FE4152BD}"/>
-              </a:ext>
-            </a:extLst>
-          </p:cNvPr>
-          <p:cNvPicPr>
-            <a:picLocks noChangeAspect="1"/>
-          </p:cNvPicPr>
-          <p:nvPr/>
-        </p:nvPicPr>
-        <p:blipFill>
-          <a:blip r:embed="rId2"/>
-          <a:stretch>
-            <a:fillRect/>
-          </a:stretch>
-        </p:blipFill>
-        <p:spPr>
-          <a:xfrm>
-            <a:off x="1213551" y="520411"/>
-            <a:ext cx="4042033" cy="4450357"/>
-          </a:xfrm>
-          <a:prstGeom prst="rect">
-            <a:avLst/>
-          </a:prstGeom>
-          <a:solidFill>
-            <a:srgbClr val="FFFFFF">
-              <a:shade val="85000"/>
-            </a:srgbClr>
-          </a:solidFill>
-          <a:ln w="190500" cap="rnd">
-            <a:solidFill>
-              <a:srgbClr val="FFFFFF"/>
-            </a:solidFill>
-          </a:ln>
-          <a:effectLst>
-            <a:outerShdw blurRad="50000" algn="tl" rotWithShape="0">
-              <a:srgbClr val="000000">
-                <a:alpha val="41000"/>
-              </a:srgbClr>
-            </a:outerShdw>
-          </a:effectLst>
-          <a:scene3d>
-            <a:camera prst="orthographicFront"/>
-            <a:lightRig rig="twoPt" dir="t">
-              <a:rot lat="0" lon="0" rev="7800000"/>
-            </a:lightRig>
-          </a:scene3d>
-          <a:sp3d contourW="6350">
-            <a:bevelT w="50800" h="16510"/>
-            <a:contourClr>
-              <a:srgbClr val="C0C0C0"/>
-            </a:contourClr>
-          </a:sp3d>
-        </p:spPr>
-      </p:pic>
       <p:sp>
         <p:nvSpPr>
           <p:cNvPr id="2" name="Slide Number Placeholder 1">
@@ -28840,7 +29547,16 @@
           <a:bodyPr/>
           <a:lstStyle/>
           <a:p>
-            <a:endParaRPr lang="en-US"/>
+            <a:r>
+              <a:rPr lang="en-US" dirty="0"/>
+              <a:t>Pet lovers have a higher than average bounce rate</a:t>
+            </a:r>
+          </a:p>
+          <a:p>
+            <a:r>
+              <a:rPr lang="en-US" dirty="0"/>
+              <a:t>Outdoor enthusiasts have more AND longer sessions</a:t>
+            </a:r>
           </a:p>
         </p:txBody>
       </p:sp>
@@ -28890,7 +29606,10 @@
           <a:bodyPr/>
           <a:lstStyle/>
           <a:p>
-            <a:endParaRPr lang="en-US"/>
+            <a:r>
+              <a:rPr lang="en-US" dirty="0"/>
+              <a:t>Animal shots from weddings?</a:t>
+            </a:r>
           </a:p>
         </p:txBody>
       </p:sp>
@@ -28977,6 +29696,1097 @@
           <a:chExt cx="0" cy="0"/>
         </a:xfrm>
       </p:grpSpPr>
+      <p:pic>
+        <p:nvPicPr>
+          <p:cNvPr id="14" name="Picture Placeholder 13">
+            <a:extLst>
+              <a:ext uri="{FF2B5EF4-FFF2-40B4-BE49-F238E27FC236}">
+                <a16:creationId xmlns:a16="http://schemas.microsoft.com/office/drawing/2014/main" id="{5E4B2181-17F5-7B4D-A697-DBEB004D6925}"/>
+              </a:ext>
+            </a:extLst>
+          </p:cNvPr>
+          <p:cNvPicPr preferRelativeResize="0">
+            <a:picLocks noGrp="1" noChangeAspect="1"/>
+          </p:cNvPicPr>
+          <p:nvPr>
+            <p:ph type="pic" sz="quarter" idx="18"/>
+          </p:nvPr>
+        </p:nvPicPr>
+        <p:blipFill>
+          <a:blip r:embed="rId2"/>
+          <a:stretch>
+            <a:fillRect/>
+          </a:stretch>
+        </p:blipFill>
+        <p:spPr>
+          <a:xfrm>
+            <a:off x="358799" y="2117468"/>
+            <a:ext cx="5593877" cy="1529781"/>
+          </a:xfrm>
+        </p:spPr>
+      </p:pic>
+      <p:sp>
+        <p:nvSpPr>
+          <p:cNvPr id="3" name="Text Placeholder 2">
+            <a:extLst>
+              <a:ext uri="{FF2B5EF4-FFF2-40B4-BE49-F238E27FC236}">
+                <a16:creationId xmlns:a16="http://schemas.microsoft.com/office/drawing/2014/main" id="{2E85858A-7334-E04A-ACE8-00F9227874A6}"/>
+              </a:ext>
+            </a:extLst>
+          </p:cNvPr>
+          <p:cNvSpPr>
+            <a:spLocks noGrp="1"/>
+          </p:cNvSpPr>
+          <p:nvPr>
+            <p:ph type="body" sz="quarter" idx="16"/>
+          </p:nvPr>
+        </p:nvSpPr>
+        <p:spPr/>
+        <p:txBody>
+          <a:bodyPr/>
+          <a:lstStyle/>
+          <a:p>
+            <a:r>
+              <a:rPr lang="en-US" dirty="0"/>
+              <a:t>Behavior</a:t>
+            </a:r>
+          </a:p>
+        </p:txBody>
+      </p:sp>
+      <p:sp>
+        <p:nvSpPr>
+          <p:cNvPr id="4" name="Slide Number Placeholder 3">
+            <a:extLst>
+              <a:ext uri="{FF2B5EF4-FFF2-40B4-BE49-F238E27FC236}">
+                <a16:creationId xmlns:a16="http://schemas.microsoft.com/office/drawing/2014/main" id="{D19CE25F-D15F-3F49-84FA-E1D5E007B68F}"/>
+              </a:ext>
+            </a:extLst>
+          </p:cNvPr>
+          <p:cNvSpPr>
+            <a:spLocks noGrp="1"/>
+          </p:cNvSpPr>
+          <p:nvPr>
+            <p:ph type="sldNum" sz="quarter" idx="11"/>
+          </p:nvPr>
+        </p:nvSpPr>
+        <p:spPr/>
+        <p:txBody>
+          <a:bodyPr/>
+          <a:lstStyle/>
+          <a:p>
+            <a:fld id="{26699011-AD31-4C1E-9097-A1CA72DD0DA4}" type="slidenum">
+              <a:rPr lang="en-US" noProof="0" smtClean="0"/>
+              <a:t>6</a:t>
+            </a:fld>
+            <a:endParaRPr lang="en-US" noProof="0" dirty="0"/>
+          </a:p>
+        </p:txBody>
+      </p:sp>
+      <p:pic>
+        <p:nvPicPr>
+          <p:cNvPr id="16" name="Picture Placeholder 15">
+            <a:extLst>
+              <a:ext uri="{FF2B5EF4-FFF2-40B4-BE49-F238E27FC236}">
+                <a16:creationId xmlns:a16="http://schemas.microsoft.com/office/drawing/2014/main" id="{E26D45F4-7510-8049-AD83-A0A901EF2FCC}"/>
+              </a:ext>
+            </a:extLst>
+          </p:cNvPr>
+          <p:cNvPicPr preferRelativeResize="0">
+            <a:picLocks noGrp="1" noChangeAspect="1"/>
+          </p:cNvPicPr>
+          <p:nvPr>
+            <p:ph type="pic" sz="quarter" idx="39"/>
+          </p:nvPr>
+        </p:nvPicPr>
+        <p:blipFill>
+          <a:blip r:embed="rId3"/>
+          <a:stretch>
+            <a:fillRect/>
+          </a:stretch>
+        </p:blipFill>
+        <p:spPr>
+          <a:xfrm>
+            <a:off x="6421046" y="491017"/>
+            <a:ext cx="5412154" cy="1626451"/>
+          </a:xfrm>
+        </p:spPr>
+      </p:pic>
+      <p:sp>
+        <p:nvSpPr>
+          <p:cNvPr id="6" name="Text Placeholder 5">
+            <a:extLst>
+              <a:ext uri="{FF2B5EF4-FFF2-40B4-BE49-F238E27FC236}">
+                <a16:creationId xmlns:a16="http://schemas.microsoft.com/office/drawing/2014/main" id="{9FF73000-2458-364C-80D9-B5842A0D16AC}"/>
+              </a:ext>
+            </a:extLst>
+          </p:cNvPr>
+          <p:cNvSpPr>
+            <a:spLocks noGrp="1"/>
+          </p:cNvSpPr>
+          <p:nvPr>
+            <p:ph type="body" sz="quarter" idx="33"/>
+          </p:nvPr>
+        </p:nvSpPr>
+        <p:spPr>
+          <a:xfrm>
+            <a:off x="358799" y="4112743"/>
+            <a:ext cx="5544001" cy="789671"/>
+          </a:xfrm>
+        </p:spPr>
+        <p:txBody>
+          <a:bodyPr/>
+          <a:lstStyle/>
+          <a:p>
+            <a:r>
+              <a:rPr lang="en-US" dirty="0"/>
+              <a:t>New vs Returning</a:t>
+            </a:r>
+          </a:p>
+        </p:txBody>
+      </p:sp>
+      <p:sp>
+        <p:nvSpPr>
+          <p:cNvPr id="7" name="Text Placeholder 6">
+            <a:extLst>
+              <a:ext uri="{FF2B5EF4-FFF2-40B4-BE49-F238E27FC236}">
+                <a16:creationId xmlns:a16="http://schemas.microsoft.com/office/drawing/2014/main" id="{3DBFFA3B-C1E5-FD42-9E41-D960BA08A2C6}"/>
+              </a:ext>
+            </a:extLst>
+          </p:cNvPr>
+          <p:cNvSpPr>
+            <a:spLocks noGrp="1"/>
+          </p:cNvSpPr>
+          <p:nvPr>
+            <p:ph type="body" sz="quarter" idx="38"/>
+          </p:nvPr>
+        </p:nvSpPr>
+        <p:spPr/>
+        <p:txBody>
+          <a:bodyPr/>
+          <a:lstStyle/>
+          <a:p>
+            <a:r>
+              <a:rPr lang="en-US" dirty="0"/>
+              <a:t>Engagement</a:t>
+            </a:r>
+          </a:p>
+        </p:txBody>
+      </p:sp>
+      <p:sp>
+        <p:nvSpPr>
+          <p:cNvPr id="8" name="Text Placeholder 7">
+            <a:extLst>
+              <a:ext uri="{FF2B5EF4-FFF2-40B4-BE49-F238E27FC236}">
+                <a16:creationId xmlns:a16="http://schemas.microsoft.com/office/drawing/2014/main" id="{2CF3C4B1-9CBC-E84B-A052-6766E230EB3A}"/>
+              </a:ext>
+            </a:extLst>
+          </p:cNvPr>
+          <p:cNvSpPr>
+            <a:spLocks noGrp="1"/>
+          </p:cNvSpPr>
+          <p:nvPr>
+            <p:ph type="body" sz="quarter" idx="40"/>
+          </p:nvPr>
+        </p:nvSpPr>
+        <p:spPr>
+          <a:xfrm>
+            <a:off x="358799" y="5095186"/>
+            <a:ext cx="5407624" cy="884238"/>
+          </a:xfrm>
+        </p:spPr>
+        <p:txBody>
+          <a:bodyPr/>
+          <a:lstStyle/>
+          <a:p>
+            <a:r>
+              <a:rPr lang="en-US" dirty="0"/>
+              <a:t>Returning visitors are more engaged</a:t>
+            </a:r>
+          </a:p>
+        </p:txBody>
+      </p:sp>
+      <p:sp>
+        <p:nvSpPr>
+          <p:cNvPr id="9" name="Text Placeholder 8">
+            <a:extLst>
+              <a:ext uri="{FF2B5EF4-FFF2-40B4-BE49-F238E27FC236}">
+                <a16:creationId xmlns:a16="http://schemas.microsoft.com/office/drawing/2014/main" id="{701A9E74-E7C1-3749-B30F-74B18D35EAF0}"/>
+              </a:ext>
+            </a:extLst>
+          </p:cNvPr>
+          <p:cNvSpPr>
+            <a:spLocks noGrp="1"/>
+          </p:cNvSpPr>
+          <p:nvPr>
+            <p:ph type="body" sz="quarter" idx="41"/>
+          </p:nvPr>
+        </p:nvSpPr>
+        <p:spPr/>
+        <p:txBody>
+          <a:bodyPr/>
+          <a:lstStyle/>
+          <a:p>
+            <a:r>
+              <a:rPr lang="en-US" dirty="0"/>
+              <a:t>Many sessions and pageviews between 181-600 secs (3-10 mins)</a:t>
+            </a:r>
+          </a:p>
+          <a:p>
+            <a:r>
+              <a:rPr lang="en-US" dirty="0"/>
+              <a:t>Large number of &lt;=10 sec visits likely due to bounce rate</a:t>
+            </a:r>
+          </a:p>
+        </p:txBody>
+      </p:sp>
+      <p:sp>
+        <p:nvSpPr>
+          <p:cNvPr id="10" name="Text Placeholder 9">
+            <a:extLst>
+              <a:ext uri="{FF2B5EF4-FFF2-40B4-BE49-F238E27FC236}">
+                <a16:creationId xmlns:a16="http://schemas.microsoft.com/office/drawing/2014/main" id="{3386B7AF-DE01-7E4F-A7CB-816173458CF0}"/>
+              </a:ext>
+            </a:extLst>
+          </p:cNvPr>
+          <p:cNvSpPr>
+            <a:spLocks noGrp="1"/>
+          </p:cNvSpPr>
+          <p:nvPr>
+            <p:ph type="body" sz="quarter" idx="42"/>
+          </p:nvPr>
+        </p:nvSpPr>
+        <p:spPr/>
+        <p:txBody>
+          <a:bodyPr/>
+          <a:lstStyle/>
+          <a:p>
+            <a:r>
+              <a:rPr lang="en-US" dirty="0"/>
+              <a:t> </a:t>
+            </a:r>
+          </a:p>
+        </p:txBody>
+      </p:sp>
+      <p:sp>
+        <p:nvSpPr>
+          <p:cNvPr id="11" name="Text Placeholder 10">
+            <a:extLst>
+              <a:ext uri="{FF2B5EF4-FFF2-40B4-BE49-F238E27FC236}">
+                <a16:creationId xmlns:a16="http://schemas.microsoft.com/office/drawing/2014/main" id="{B191A876-AC2F-6748-A48E-3F8C78177708}"/>
+              </a:ext>
+            </a:extLst>
+          </p:cNvPr>
+          <p:cNvSpPr>
+            <a:spLocks noGrp="1"/>
+          </p:cNvSpPr>
+          <p:nvPr>
+            <p:ph type="body" sz="quarter" idx="43"/>
+          </p:nvPr>
+        </p:nvSpPr>
+        <p:spPr/>
+        <p:txBody>
+          <a:bodyPr/>
+          <a:lstStyle/>
+          <a:p>
+            <a:r>
+              <a:rPr lang="en-US" dirty="0"/>
+              <a:t> </a:t>
+            </a:r>
+          </a:p>
+        </p:txBody>
+      </p:sp>
+      <p:sp>
+        <p:nvSpPr>
+          <p:cNvPr id="12" name="Text Placeholder 11">
+            <a:extLst>
+              <a:ext uri="{FF2B5EF4-FFF2-40B4-BE49-F238E27FC236}">
+                <a16:creationId xmlns:a16="http://schemas.microsoft.com/office/drawing/2014/main" id="{739A8ED4-4C68-0344-AE69-375FF6BFF915}"/>
+              </a:ext>
+            </a:extLst>
+          </p:cNvPr>
+          <p:cNvSpPr>
+            <a:spLocks noGrp="1"/>
+          </p:cNvSpPr>
+          <p:nvPr>
+            <p:ph type="body" sz="quarter" idx="44"/>
+          </p:nvPr>
+        </p:nvSpPr>
+        <p:spPr/>
+        <p:txBody>
+          <a:bodyPr/>
+          <a:lstStyle/>
+          <a:p>
+            <a:r>
+              <a:rPr lang="en-US" dirty="0"/>
+              <a:t>AUDIENCE</a:t>
+            </a:r>
+          </a:p>
+        </p:txBody>
+      </p:sp>
+      <p:pic>
+        <p:nvPicPr>
+          <p:cNvPr id="18" name="Picture 17">
+            <a:extLst>
+              <a:ext uri="{FF2B5EF4-FFF2-40B4-BE49-F238E27FC236}">
+                <a16:creationId xmlns:a16="http://schemas.microsoft.com/office/drawing/2014/main" id="{54B40A85-2F97-6F40-B111-E38F73BA6C94}"/>
+              </a:ext>
+            </a:extLst>
+          </p:cNvPr>
+          <p:cNvPicPr>
+            <a:picLocks noChangeAspect="1"/>
+          </p:cNvPicPr>
+          <p:nvPr/>
+        </p:nvPicPr>
+        <p:blipFill>
+          <a:blip r:embed="rId4"/>
+          <a:stretch>
+            <a:fillRect/>
+          </a:stretch>
+        </p:blipFill>
+        <p:spPr>
+          <a:xfrm>
+            <a:off x="6429876" y="2237686"/>
+            <a:ext cx="5452170" cy="1640601"/>
+          </a:xfrm>
+          <a:prstGeom prst="rect">
+            <a:avLst/>
+          </a:prstGeom>
+        </p:spPr>
+      </p:pic>
+    </p:spTree>
+    <p:extLst>
+      <p:ext uri="{BB962C8B-B14F-4D97-AF65-F5344CB8AC3E}">
+        <p14:creationId xmlns:p14="http://schemas.microsoft.com/office/powerpoint/2010/main" val="2883168749"/>
+      </p:ext>
+    </p:extLst>
+  </p:cSld>
+  <p:clrMapOvr>
+    <a:masterClrMapping/>
+  </p:clrMapOvr>
+</p:sld>
+</file>
+
+<file path=ppt/slides/slide7.xml><?xml version="1.0" encoding="utf-8"?>
+<p:sld xmlns:a="http://schemas.openxmlformats.org/drawingml/2006/main" xmlns:r="http://schemas.openxmlformats.org/officeDocument/2006/relationships" xmlns:p="http://schemas.openxmlformats.org/presentationml/2006/main">
+  <p:cSld>
+    <p:spTree>
+      <p:nvGrpSpPr>
+        <p:cNvPr id="1" name=""/>
+        <p:cNvGrpSpPr/>
+        <p:nvPr/>
+      </p:nvGrpSpPr>
+      <p:grpSpPr>
+        <a:xfrm>
+          <a:off x="0" y="0"/>
+          <a:ext cx="0" cy="0"/>
+          <a:chOff x="0" y="0"/>
+          <a:chExt cx="0" cy="0"/>
+        </a:xfrm>
+      </p:grpSpPr>
+      <p:pic>
+        <p:nvPicPr>
+          <p:cNvPr id="14" name="Picture Placeholder 13">
+            <a:extLst>
+              <a:ext uri="{FF2B5EF4-FFF2-40B4-BE49-F238E27FC236}">
+                <a16:creationId xmlns:a16="http://schemas.microsoft.com/office/drawing/2014/main" id="{27BA9898-DC34-6F48-940A-82636A41EC3C}"/>
+              </a:ext>
+            </a:extLst>
+          </p:cNvPr>
+          <p:cNvPicPr preferRelativeResize="0">
+            <a:picLocks noGrp="1" noChangeAspect="1"/>
+          </p:cNvPicPr>
+          <p:nvPr>
+            <p:ph type="pic" sz="quarter" idx="18"/>
+          </p:nvPr>
+        </p:nvPicPr>
+        <p:blipFill>
+          <a:blip r:embed="rId2"/>
+          <a:stretch>
+            <a:fillRect/>
+          </a:stretch>
+        </p:blipFill>
+        <p:spPr>
+          <a:xfrm>
+            <a:off x="358799" y="2023679"/>
+            <a:ext cx="5544001" cy="1737672"/>
+          </a:xfrm>
+        </p:spPr>
+      </p:pic>
+      <p:sp>
+        <p:nvSpPr>
+          <p:cNvPr id="3" name="Text Placeholder 2">
+            <a:extLst>
+              <a:ext uri="{FF2B5EF4-FFF2-40B4-BE49-F238E27FC236}">
+                <a16:creationId xmlns:a16="http://schemas.microsoft.com/office/drawing/2014/main" id="{345DAF52-FAB5-2C49-9F43-F8A566ECA9D5}"/>
+              </a:ext>
+            </a:extLst>
+          </p:cNvPr>
+          <p:cNvSpPr>
+            <a:spLocks noGrp="1"/>
+          </p:cNvSpPr>
+          <p:nvPr>
+            <p:ph type="body" sz="quarter" idx="16"/>
+          </p:nvPr>
+        </p:nvSpPr>
+        <p:spPr/>
+        <p:txBody>
+          <a:bodyPr/>
+          <a:lstStyle/>
+          <a:p>
+            <a:r>
+              <a:rPr lang="en-US" dirty="0"/>
+              <a:t>Technology</a:t>
+            </a:r>
+          </a:p>
+        </p:txBody>
+      </p:sp>
+      <p:sp>
+        <p:nvSpPr>
+          <p:cNvPr id="4" name="Slide Number Placeholder 3">
+            <a:extLst>
+              <a:ext uri="{FF2B5EF4-FFF2-40B4-BE49-F238E27FC236}">
+                <a16:creationId xmlns:a16="http://schemas.microsoft.com/office/drawing/2014/main" id="{4EA7B74D-5EEB-6747-AC62-36019A7CAA6B}"/>
+              </a:ext>
+            </a:extLst>
+          </p:cNvPr>
+          <p:cNvSpPr>
+            <a:spLocks noGrp="1"/>
+          </p:cNvSpPr>
+          <p:nvPr>
+            <p:ph type="sldNum" sz="quarter" idx="11"/>
+          </p:nvPr>
+        </p:nvSpPr>
+        <p:spPr/>
+        <p:txBody>
+          <a:bodyPr/>
+          <a:lstStyle/>
+          <a:p>
+            <a:fld id="{26699011-AD31-4C1E-9097-A1CA72DD0DA4}" type="slidenum">
+              <a:rPr lang="en-US" noProof="0" smtClean="0"/>
+              <a:t>7</a:t>
+            </a:fld>
+            <a:endParaRPr lang="en-US" noProof="0" dirty="0"/>
+          </a:p>
+        </p:txBody>
+      </p:sp>
+      <p:pic>
+        <p:nvPicPr>
+          <p:cNvPr id="16" name="Picture Placeholder 15">
+            <a:extLst>
+              <a:ext uri="{FF2B5EF4-FFF2-40B4-BE49-F238E27FC236}">
+                <a16:creationId xmlns:a16="http://schemas.microsoft.com/office/drawing/2014/main" id="{99082E03-1228-BC46-9395-7C3EA7349401}"/>
+              </a:ext>
+            </a:extLst>
+          </p:cNvPr>
+          <p:cNvPicPr preferRelativeResize="0">
+            <a:picLocks noGrp="1" noChangeAspect="1"/>
+          </p:cNvPicPr>
+          <p:nvPr>
+            <p:ph type="pic" sz="quarter" idx="39"/>
+          </p:nvPr>
+        </p:nvPicPr>
+        <p:blipFill>
+          <a:blip r:embed="rId3"/>
+          <a:stretch>
+            <a:fillRect/>
+          </a:stretch>
+        </p:blipFill>
+        <p:spPr>
+          <a:xfrm>
+            <a:off x="6421046" y="761511"/>
+            <a:ext cx="5502500" cy="2999840"/>
+          </a:xfrm>
+        </p:spPr>
+      </p:pic>
+      <p:sp>
+        <p:nvSpPr>
+          <p:cNvPr id="6" name="Text Placeholder 5">
+            <a:extLst>
+              <a:ext uri="{FF2B5EF4-FFF2-40B4-BE49-F238E27FC236}">
+                <a16:creationId xmlns:a16="http://schemas.microsoft.com/office/drawing/2014/main" id="{1FE50A94-D1B4-AB40-8A8E-C35171E29169}"/>
+              </a:ext>
+            </a:extLst>
+          </p:cNvPr>
+          <p:cNvSpPr>
+            <a:spLocks noGrp="1"/>
+          </p:cNvSpPr>
+          <p:nvPr>
+            <p:ph type="body" sz="quarter" idx="33"/>
+          </p:nvPr>
+        </p:nvSpPr>
+        <p:spPr/>
+        <p:txBody>
+          <a:bodyPr/>
+          <a:lstStyle/>
+          <a:p>
+            <a:r>
+              <a:rPr lang="en-US" dirty="0"/>
+              <a:t>Browser &amp; OS (Operating System)</a:t>
+            </a:r>
+          </a:p>
+        </p:txBody>
+      </p:sp>
+      <p:sp>
+        <p:nvSpPr>
+          <p:cNvPr id="7" name="Text Placeholder 6">
+            <a:extLst>
+              <a:ext uri="{FF2B5EF4-FFF2-40B4-BE49-F238E27FC236}">
+                <a16:creationId xmlns:a16="http://schemas.microsoft.com/office/drawing/2014/main" id="{FF3B73F2-B99C-C244-9108-F12808FC3116}"/>
+              </a:ext>
+            </a:extLst>
+          </p:cNvPr>
+          <p:cNvSpPr>
+            <a:spLocks noGrp="1"/>
+          </p:cNvSpPr>
+          <p:nvPr>
+            <p:ph type="body" sz="quarter" idx="38"/>
+          </p:nvPr>
+        </p:nvSpPr>
+        <p:spPr/>
+        <p:txBody>
+          <a:bodyPr/>
+          <a:lstStyle/>
+          <a:p>
+            <a:r>
+              <a:rPr lang="en-US" dirty="0"/>
+              <a:t>Browser &amp; OS (Screen Resolution)</a:t>
+            </a:r>
+          </a:p>
+        </p:txBody>
+      </p:sp>
+      <p:sp>
+        <p:nvSpPr>
+          <p:cNvPr id="8" name="Text Placeholder 7">
+            <a:extLst>
+              <a:ext uri="{FF2B5EF4-FFF2-40B4-BE49-F238E27FC236}">
+                <a16:creationId xmlns:a16="http://schemas.microsoft.com/office/drawing/2014/main" id="{B2F940A9-EA1C-814E-B6CF-19E055DCB603}"/>
+              </a:ext>
+            </a:extLst>
+          </p:cNvPr>
+          <p:cNvSpPr>
+            <a:spLocks noGrp="1"/>
+          </p:cNvSpPr>
+          <p:nvPr>
+            <p:ph type="body" sz="quarter" idx="40"/>
+          </p:nvPr>
+        </p:nvSpPr>
+        <p:spPr/>
+        <p:txBody>
+          <a:bodyPr/>
+          <a:lstStyle/>
+          <a:p>
+            <a:r>
+              <a:rPr lang="en-US" dirty="0"/>
+              <a:t>100% of visitors using Linux leave immediately</a:t>
+            </a:r>
+          </a:p>
+        </p:txBody>
+      </p:sp>
+      <p:sp>
+        <p:nvSpPr>
+          <p:cNvPr id="9" name="Text Placeholder 8">
+            <a:extLst>
+              <a:ext uri="{FF2B5EF4-FFF2-40B4-BE49-F238E27FC236}">
+                <a16:creationId xmlns:a16="http://schemas.microsoft.com/office/drawing/2014/main" id="{9E9E9162-CA57-8247-AE68-DCEB11D14B81}"/>
+              </a:ext>
+            </a:extLst>
+          </p:cNvPr>
+          <p:cNvSpPr>
+            <a:spLocks noGrp="1"/>
+          </p:cNvSpPr>
+          <p:nvPr>
+            <p:ph type="body" sz="quarter" idx="41"/>
+          </p:nvPr>
+        </p:nvSpPr>
+        <p:spPr/>
+        <p:txBody>
+          <a:bodyPr/>
+          <a:lstStyle/>
+          <a:p>
+            <a:r>
+              <a:rPr lang="en-US" dirty="0"/>
+              <a:t>Visitors with the highest screen resolutions for Chrome and Firefox  have 100% bounce rate</a:t>
+            </a:r>
+          </a:p>
+        </p:txBody>
+      </p:sp>
+      <p:sp>
+        <p:nvSpPr>
+          <p:cNvPr id="10" name="Text Placeholder 9">
+            <a:extLst>
+              <a:ext uri="{FF2B5EF4-FFF2-40B4-BE49-F238E27FC236}">
+                <a16:creationId xmlns:a16="http://schemas.microsoft.com/office/drawing/2014/main" id="{D51FF69A-0C96-3043-96C6-CD43347DC8B6}"/>
+              </a:ext>
+            </a:extLst>
+          </p:cNvPr>
+          <p:cNvSpPr>
+            <a:spLocks noGrp="1"/>
+          </p:cNvSpPr>
+          <p:nvPr>
+            <p:ph type="body" sz="quarter" idx="42"/>
+          </p:nvPr>
+        </p:nvSpPr>
+        <p:spPr/>
+        <p:txBody>
+          <a:bodyPr/>
+          <a:lstStyle/>
+          <a:p>
+            <a:r>
+              <a:rPr lang="en-US" dirty="0"/>
+              <a:t>Look into needed tech fixes</a:t>
+            </a:r>
+          </a:p>
+        </p:txBody>
+      </p:sp>
+      <p:sp>
+        <p:nvSpPr>
+          <p:cNvPr id="11" name="Text Placeholder 10">
+            <a:extLst>
+              <a:ext uri="{FF2B5EF4-FFF2-40B4-BE49-F238E27FC236}">
+                <a16:creationId xmlns:a16="http://schemas.microsoft.com/office/drawing/2014/main" id="{0C6E46D4-EABA-2C4F-8AF2-E27BB23F5F4A}"/>
+              </a:ext>
+            </a:extLst>
+          </p:cNvPr>
+          <p:cNvSpPr>
+            <a:spLocks noGrp="1"/>
+          </p:cNvSpPr>
+          <p:nvPr>
+            <p:ph type="body" sz="quarter" idx="43"/>
+          </p:nvPr>
+        </p:nvSpPr>
+        <p:spPr/>
+        <p:txBody>
+          <a:bodyPr/>
+          <a:lstStyle/>
+          <a:p>
+            <a:r>
+              <a:rPr lang="en-US" dirty="0"/>
+              <a:t>Look into loading times</a:t>
+            </a:r>
+          </a:p>
+        </p:txBody>
+      </p:sp>
+      <p:sp>
+        <p:nvSpPr>
+          <p:cNvPr id="12" name="Text Placeholder 11">
+            <a:extLst>
+              <a:ext uri="{FF2B5EF4-FFF2-40B4-BE49-F238E27FC236}">
+                <a16:creationId xmlns:a16="http://schemas.microsoft.com/office/drawing/2014/main" id="{E8A6D979-CDAE-8F49-B4EE-9CC62E8E30E8}"/>
+              </a:ext>
+            </a:extLst>
+          </p:cNvPr>
+          <p:cNvSpPr>
+            <a:spLocks noGrp="1"/>
+          </p:cNvSpPr>
+          <p:nvPr>
+            <p:ph type="body" sz="quarter" idx="44"/>
+          </p:nvPr>
+        </p:nvSpPr>
+        <p:spPr/>
+        <p:txBody>
+          <a:bodyPr/>
+          <a:lstStyle/>
+          <a:p>
+            <a:r>
+              <a:rPr lang="en-US" dirty="0"/>
+              <a:t>AUDIENCE</a:t>
+            </a:r>
+          </a:p>
+        </p:txBody>
+      </p:sp>
+    </p:spTree>
+    <p:extLst>
+      <p:ext uri="{BB962C8B-B14F-4D97-AF65-F5344CB8AC3E}">
+        <p14:creationId xmlns:p14="http://schemas.microsoft.com/office/powerpoint/2010/main" val="496050294"/>
+      </p:ext>
+    </p:extLst>
+  </p:cSld>
+  <p:clrMapOvr>
+    <a:masterClrMapping/>
+  </p:clrMapOvr>
+</p:sld>
+</file>
+
+<file path=ppt/slides/slide8.xml><?xml version="1.0" encoding="utf-8"?>
+<p:sld xmlns:a="http://schemas.openxmlformats.org/drawingml/2006/main" xmlns:r="http://schemas.openxmlformats.org/officeDocument/2006/relationships" xmlns:p="http://schemas.openxmlformats.org/presentationml/2006/main">
+  <p:cSld>
+    <p:spTree>
+      <p:nvGrpSpPr>
+        <p:cNvPr id="1" name=""/>
+        <p:cNvGrpSpPr/>
+        <p:nvPr/>
+      </p:nvGrpSpPr>
+      <p:grpSpPr>
+        <a:xfrm>
+          <a:off x="0" y="0"/>
+          <a:ext cx="0" cy="0"/>
+          <a:chOff x="0" y="0"/>
+          <a:chExt cx="0" cy="0"/>
+        </a:xfrm>
+      </p:grpSpPr>
+      <p:pic>
+        <p:nvPicPr>
+          <p:cNvPr id="14" name="Picture Placeholder 13">
+            <a:extLst>
+              <a:ext uri="{FF2B5EF4-FFF2-40B4-BE49-F238E27FC236}">
+                <a16:creationId xmlns:a16="http://schemas.microsoft.com/office/drawing/2014/main" id="{4745325D-CD60-4A4B-87C8-BDE03E30EC66}"/>
+              </a:ext>
+            </a:extLst>
+          </p:cNvPr>
+          <p:cNvPicPr preferRelativeResize="0">
+            <a:picLocks noGrp="1" noChangeAspect="1"/>
+          </p:cNvPicPr>
+          <p:nvPr>
+            <p:ph type="pic" sz="quarter" idx="18"/>
+          </p:nvPr>
+        </p:nvPicPr>
+        <p:blipFill>
+          <a:blip r:embed="rId2"/>
+          <a:stretch>
+            <a:fillRect/>
+          </a:stretch>
+        </p:blipFill>
+        <p:spPr>
+          <a:xfrm>
+            <a:off x="358799" y="1968987"/>
+            <a:ext cx="5556737" cy="1715201"/>
+          </a:xfrm>
+        </p:spPr>
+      </p:pic>
+      <p:sp>
+        <p:nvSpPr>
+          <p:cNvPr id="3" name="Text Placeholder 2">
+            <a:extLst>
+              <a:ext uri="{FF2B5EF4-FFF2-40B4-BE49-F238E27FC236}">
+                <a16:creationId xmlns:a16="http://schemas.microsoft.com/office/drawing/2014/main" id="{43896DA5-852D-5346-925F-2D46E6653242}"/>
+              </a:ext>
+            </a:extLst>
+          </p:cNvPr>
+          <p:cNvSpPr>
+            <a:spLocks noGrp="1"/>
+          </p:cNvSpPr>
+          <p:nvPr>
+            <p:ph type="body" sz="quarter" idx="16"/>
+          </p:nvPr>
+        </p:nvSpPr>
+        <p:spPr/>
+        <p:txBody>
+          <a:bodyPr/>
+          <a:lstStyle/>
+          <a:p>
+            <a:r>
+              <a:rPr lang="en-US" dirty="0"/>
+              <a:t>Mobile</a:t>
+            </a:r>
+          </a:p>
+        </p:txBody>
+      </p:sp>
+      <p:sp>
+        <p:nvSpPr>
+          <p:cNvPr id="4" name="Slide Number Placeholder 3">
+            <a:extLst>
+              <a:ext uri="{FF2B5EF4-FFF2-40B4-BE49-F238E27FC236}">
+                <a16:creationId xmlns:a16="http://schemas.microsoft.com/office/drawing/2014/main" id="{70BC2BE6-9D57-6941-AB82-BEC7D6EE1FB6}"/>
+              </a:ext>
+            </a:extLst>
+          </p:cNvPr>
+          <p:cNvSpPr>
+            <a:spLocks noGrp="1"/>
+          </p:cNvSpPr>
+          <p:nvPr>
+            <p:ph type="sldNum" sz="quarter" idx="11"/>
+          </p:nvPr>
+        </p:nvSpPr>
+        <p:spPr/>
+        <p:txBody>
+          <a:bodyPr/>
+          <a:lstStyle/>
+          <a:p>
+            <a:fld id="{26699011-AD31-4C1E-9097-A1CA72DD0DA4}" type="slidenum">
+              <a:rPr lang="en-US" noProof="0" smtClean="0"/>
+              <a:t>8</a:t>
+            </a:fld>
+            <a:endParaRPr lang="en-US" noProof="0" dirty="0"/>
+          </a:p>
+        </p:txBody>
+      </p:sp>
+      <p:pic>
+        <p:nvPicPr>
+          <p:cNvPr id="16" name="Picture Placeholder 15">
+            <a:extLst>
+              <a:ext uri="{FF2B5EF4-FFF2-40B4-BE49-F238E27FC236}">
+                <a16:creationId xmlns:a16="http://schemas.microsoft.com/office/drawing/2014/main" id="{BD6906AE-ACC9-E54A-87A8-BCB5FC2FF743}"/>
+              </a:ext>
+            </a:extLst>
+          </p:cNvPr>
+          <p:cNvPicPr preferRelativeResize="0">
+            <a:picLocks noGrp="1" noChangeAspect="1"/>
+          </p:cNvPicPr>
+          <p:nvPr>
+            <p:ph type="pic" sz="quarter" idx="39"/>
+          </p:nvPr>
+        </p:nvPicPr>
+        <p:blipFill>
+          <a:blip r:embed="rId3"/>
+          <a:stretch>
+            <a:fillRect/>
+          </a:stretch>
+        </p:blipFill>
+        <p:spPr>
+          <a:xfrm>
+            <a:off x="6429876" y="2053224"/>
+            <a:ext cx="5526222" cy="1630964"/>
+          </a:xfrm>
+        </p:spPr>
+      </p:pic>
+      <p:sp>
+        <p:nvSpPr>
+          <p:cNvPr id="6" name="Text Placeholder 5">
+            <a:extLst>
+              <a:ext uri="{FF2B5EF4-FFF2-40B4-BE49-F238E27FC236}">
+                <a16:creationId xmlns:a16="http://schemas.microsoft.com/office/drawing/2014/main" id="{A39512DE-8A5E-5A4E-8B23-C502D614D081}"/>
+              </a:ext>
+            </a:extLst>
+          </p:cNvPr>
+          <p:cNvSpPr>
+            <a:spLocks noGrp="1"/>
+          </p:cNvSpPr>
+          <p:nvPr>
+            <p:ph type="body" sz="quarter" idx="33"/>
+          </p:nvPr>
+        </p:nvSpPr>
+        <p:spPr/>
+        <p:txBody>
+          <a:bodyPr/>
+          <a:lstStyle/>
+          <a:p>
+            <a:r>
+              <a:rPr lang="en-US" dirty="0"/>
+              <a:t>Overview</a:t>
+            </a:r>
+          </a:p>
+        </p:txBody>
+      </p:sp>
+      <p:sp>
+        <p:nvSpPr>
+          <p:cNvPr id="7" name="Text Placeholder 6">
+            <a:extLst>
+              <a:ext uri="{FF2B5EF4-FFF2-40B4-BE49-F238E27FC236}">
+                <a16:creationId xmlns:a16="http://schemas.microsoft.com/office/drawing/2014/main" id="{E9CFB445-51FB-DE44-89ED-92CA6A0BACD9}"/>
+              </a:ext>
+            </a:extLst>
+          </p:cNvPr>
+          <p:cNvSpPr>
+            <a:spLocks noGrp="1"/>
+          </p:cNvSpPr>
+          <p:nvPr>
+            <p:ph type="body" sz="quarter" idx="38"/>
+          </p:nvPr>
+        </p:nvSpPr>
+        <p:spPr>
+          <a:xfrm>
+            <a:off x="6429876" y="4107650"/>
+            <a:ext cx="5502500" cy="789671"/>
+          </a:xfrm>
+        </p:spPr>
+        <p:txBody>
+          <a:bodyPr/>
+          <a:lstStyle/>
+          <a:p>
+            <a:r>
+              <a:rPr lang="en-US" dirty="0"/>
+              <a:t>Overview (City)</a:t>
+            </a:r>
+          </a:p>
+        </p:txBody>
+      </p:sp>
+      <p:sp>
+        <p:nvSpPr>
+          <p:cNvPr id="8" name="Text Placeholder 7">
+            <a:extLst>
+              <a:ext uri="{FF2B5EF4-FFF2-40B4-BE49-F238E27FC236}">
+                <a16:creationId xmlns:a16="http://schemas.microsoft.com/office/drawing/2014/main" id="{5A739ED7-6EB4-1445-B75A-05A1029FFFFF}"/>
+              </a:ext>
+            </a:extLst>
+          </p:cNvPr>
+          <p:cNvSpPr>
+            <a:spLocks noGrp="1"/>
+          </p:cNvSpPr>
+          <p:nvPr>
+            <p:ph type="body" sz="quarter" idx="40"/>
+          </p:nvPr>
+        </p:nvSpPr>
+        <p:spPr/>
+        <p:txBody>
+          <a:bodyPr/>
+          <a:lstStyle/>
+          <a:p>
+            <a:r>
+              <a:rPr lang="en-US" dirty="0"/>
+              <a:t>45% of traffic is on mobile devices</a:t>
+            </a:r>
+          </a:p>
+          <a:p>
+            <a:r>
+              <a:rPr lang="en-US" dirty="0"/>
+              <a:t>Average session duration is much lower on mobile devices</a:t>
+            </a:r>
+          </a:p>
+        </p:txBody>
+      </p:sp>
+      <p:sp>
+        <p:nvSpPr>
+          <p:cNvPr id="9" name="Text Placeholder 8">
+            <a:extLst>
+              <a:ext uri="{FF2B5EF4-FFF2-40B4-BE49-F238E27FC236}">
+                <a16:creationId xmlns:a16="http://schemas.microsoft.com/office/drawing/2014/main" id="{1FA2D6DE-7735-384A-BBF2-F92C3A40FBB5}"/>
+              </a:ext>
+            </a:extLst>
+          </p:cNvPr>
+          <p:cNvSpPr>
+            <a:spLocks noGrp="1"/>
+          </p:cNvSpPr>
+          <p:nvPr>
+            <p:ph type="body" sz="quarter" idx="41"/>
+          </p:nvPr>
+        </p:nvSpPr>
+        <p:spPr>
+          <a:xfrm>
+            <a:off x="6429876" y="5095185"/>
+            <a:ext cx="5493670" cy="885309"/>
+          </a:xfrm>
+        </p:spPr>
+        <p:txBody>
+          <a:bodyPr/>
+          <a:lstStyle/>
+          <a:p>
+            <a:r>
+              <a:rPr lang="en-US" dirty="0"/>
+              <a:t>For Billings alone, more visitors use mobile BUT visitors using desktop have significantly more sessions</a:t>
+            </a:r>
+          </a:p>
+          <a:p>
+            <a:r>
+              <a:rPr lang="en-US" dirty="0"/>
+              <a:t>Visitors using desktop in Billings have a much higher session duration and a significantly lower bounce rate</a:t>
+            </a:r>
+          </a:p>
+        </p:txBody>
+      </p:sp>
+      <p:sp>
+        <p:nvSpPr>
+          <p:cNvPr id="10" name="Text Placeholder 9">
+            <a:extLst>
+              <a:ext uri="{FF2B5EF4-FFF2-40B4-BE49-F238E27FC236}">
+                <a16:creationId xmlns:a16="http://schemas.microsoft.com/office/drawing/2014/main" id="{1A6AB878-FD2C-4546-9AC8-EDA6D3723F40}"/>
+              </a:ext>
+            </a:extLst>
+          </p:cNvPr>
+          <p:cNvSpPr>
+            <a:spLocks noGrp="1"/>
+          </p:cNvSpPr>
+          <p:nvPr>
+            <p:ph type="body" sz="quarter" idx="42"/>
+          </p:nvPr>
+        </p:nvSpPr>
+        <p:spPr/>
+        <p:txBody>
+          <a:bodyPr/>
+          <a:lstStyle/>
+          <a:p>
+            <a:r>
+              <a:rPr lang="en-US" dirty="0"/>
+              <a:t>Make website more mobile friendly (text color, text quantity, text sizing)</a:t>
+            </a:r>
+          </a:p>
+        </p:txBody>
+      </p:sp>
+      <p:sp>
+        <p:nvSpPr>
+          <p:cNvPr id="11" name="Text Placeholder 10">
+            <a:extLst>
+              <a:ext uri="{FF2B5EF4-FFF2-40B4-BE49-F238E27FC236}">
+                <a16:creationId xmlns:a16="http://schemas.microsoft.com/office/drawing/2014/main" id="{02D9E9BE-02A7-8F4A-BFE5-263CBDC7AE27}"/>
+              </a:ext>
+            </a:extLst>
+          </p:cNvPr>
+          <p:cNvSpPr>
+            <a:spLocks noGrp="1"/>
+          </p:cNvSpPr>
+          <p:nvPr>
+            <p:ph type="body" sz="quarter" idx="43"/>
+          </p:nvPr>
+        </p:nvSpPr>
+        <p:spPr/>
+        <p:txBody>
+          <a:bodyPr/>
+          <a:lstStyle/>
+          <a:p>
+            <a:r>
+              <a:rPr lang="en-US" dirty="0"/>
+              <a:t> </a:t>
+            </a:r>
+          </a:p>
+        </p:txBody>
+      </p:sp>
+      <p:sp>
+        <p:nvSpPr>
+          <p:cNvPr id="12" name="Text Placeholder 11">
+            <a:extLst>
+              <a:ext uri="{FF2B5EF4-FFF2-40B4-BE49-F238E27FC236}">
+                <a16:creationId xmlns:a16="http://schemas.microsoft.com/office/drawing/2014/main" id="{5641515A-7A09-BF4C-B9B4-A1B4A4632D3D}"/>
+              </a:ext>
+            </a:extLst>
+          </p:cNvPr>
+          <p:cNvSpPr>
+            <a:spLocks noGrp="1"/>
+          </p:cNvSpPr>
+          <p:nvPr>
+            <p:ph type="body" sz="quarter" idx="44"/>
+          </p:nvPr>
+        </p:nvSpPr>
+        <p:spPr/>
+        <p:txBody>
+          <a:bodyPr/>
+          <a:lstStyle/>
+          <a:p>
+            <a:r>
+              <a:rPr lang="en-US" dirty="0"/>
+              <a:t>AUDIENCE</a:t>
+            </a:r>
+          </a:p>
+        </p:txBody>
+      </p:sp>
+    </p:spTree>
+    <p:extLst>
+      <p:ext uri="{BB962C8B-B14F-4D97-AF65-F5344CB8AC3E}">
+        <p14:creationId xmlns:p14="http://schemas.microsoft.com/office/powerpoint/2010/main" val="1206539544"/>
+      </p:ext>
+    </p:extLst>
+  </p:cSld>
+  <p:clrMapOvr>
+    <a:masterClrMapping/>
+  </p:clrMapOvr>
+</p:sld>
+</file>
+
+<file path=ppt/slides/slide9.xml><?xml version="1.0" encoding="utf-8"?>
+<p:sld xmlns:a="http://schemas.openxmlformats.org/drawingml/2006/main" xmlns:r="http://schemas.openxmlformats.org/officeDocument/2006/relationships" xmlns:p="http://schemas.openxmlformats.org/presentationml/2006/main">
+  <p:cSld>
+    <p:spTree>
+      <p:nvGrpSpPr>
+        <p:cNvPr id="1" name=""/>
+        <p:cNvGrpSpPr/>
+        <p:nvPr/>
+      </p:nvGrpSpPr>
+      <p:grpSpPr>
+        <a:xfrm>
+          <a:off x="0" y="0"/>
+          <a:ext cx="0" cy="0"/>
+          <a:chOff x="0" y="0"/>
+          <a:chExt cx="0" cy="0"/>
+        </a:xfrm>
+      </p:grpSpPr>
       <p:sp>
         <p:nvSpPr>
           <p:cNvPr id="31" name="Picture Placeholder 30" descr="Picture Placeholder">
@@ -29019,7 +30829,7 @@
             <a:fld id="{26699011-AD31-4C1E-9097-A1CA72DD0DA4}" type="slidenum">
               <a:rPr lang="en-US" smtClean="0"/>
               <a:pPr/>
-              <a:t>6</a:t>
+              <a:t>9</a:t>
             </a:fld>
             <a:endParaRPr lang="en-US" dirty="0"/>
           </a:p>
@@ -29282,769 +31092,6 @@
     <p:extLst>
       <p:ext uri="{BB962C8B-B14F-4D97-AF65-F5344CB8AC3E}">
         <p14:creationId xmlns:p14="http://schemas.microsoft.com/office/powerpoint/2010/main" val="3436629621"/>
-      </p:ext>
-    </p:extLst>
-  </p:cSld>
-  <p:clrMapOvr>
-    <a:masterClrMapping/>
-  </p:clrMapOvr>
-</p:sld>
-</file>
-
-<file path=ppt/slides/slide7.xml><?xml version="1.0" encoding="utf-8"?>
-<p:sld xmlns:a="http://schemas.openxmlformats.org/drawingml/2006/main" xmlns:r="http://schemas.openxmlformats.org/officeDocument/2006/relationships" xmlns:p="http://schemas.openxmlformats.org/presentationml/2006/main">
-  <p:cSld>
-    <p:spTree>
-      <p:nvGrpSpPr>
-        <p:cNvPr id="1" name=""/>
-        <p:cNvGrpSpPr/>
-        <p:nvPr/>
-      </p:nvGrpSpPr>
-      <p:grpSpPr>
-        <a:xfrm>
-          <a:off x="0" y="0"/>
-          <a:ext cx="0" cy="0"/>
-          <a:chOff x="0" y="0"/>
-          <a:chExt cx="0" cy="0"/>
-        </a:xfrm>
-      </p:grpSpPr>
-      <p:sp>
-        <p:nvSpPr>
-          <p:cNvPr id="16" name="Picture Placeholder 15" descr="Picture Placeholder">
-            <a:extLst>
-              <a:ext uri="{FF2B5EF4-FFF2-40B4-BE49-F238E27FC236}">
-                <a16:creationId xmlns:a16="http://schemas.microsoft.com/office/drawing/2014/main" id="{7233204C-53AF-44D1-9A44-231690C3AC43}"/>
-              </a:ext>
-            </a:extLst>
-          </p:cNvPr>
-          <p:cNvSpPr>
-            <a:spLocks noGrp="1"/>
-          </p:cNvSpPr>
-          <p:nvPr>
-            <p:ph type="pic" sz="quarter" idx="29"/>
-          </p:nvPr>
-        </p:nvSpPr>
-        <p:spPr/>
-      </p:sp>
-      <p:sp>
-        <p:nvSpPr>
-          <p:cNvPr id="3" name="Slide Number Placeholder 2">
-            <a:extLst>
-              <a:ext uri="{FF2B5EF4-FFF2-40B4-BE49-F238E27FC236}">
-                <a16:creationId xmlns:a16="http://schemas.microsoft.com/office/drawing/2014/main" id="{C637A3EA-4C15-4FDA-8CC7-3DBB3376221B}"/>
-              </a:ext>
-            </a:extLst>
-          </p:cNvPr>
-          <p:cNvSpPr>
-            <a:spLocks noGrp="1"/>
-          </p:cNvSpPr>
-          <p:nvPr>
-            <p:ph type="sldNum" sz="quarter" idx="11"/>
-          </p:nvPr>
-        </p:nvSpPr>
-        <p:spPr/>
-        <p:txBody>
-          <a:bodyPr/>
-          <a:lstStyle/>
-          <a:p>
-            <a:fld id="{26699011-AD31-4C1E-9097-A1CA72DD0DA4}" type="slidenum">
-              <a:rPr lang="en-US" smtClean="0"/>
-              <a:pPr/>
-              <a:t>7</a:t>
-            </a:fld>
-            <a:endParaRPr lang="en-US" dirty="0"/>
-          </a:p>
-        </p:txBody>
-      </p:sp>
-      <p:sp>
-        <p:nvSpPr>
-          <p:cNvPr id="4" name="Title 3">
-            <a:extLst>
-              <a:ext uri="{FF2B5EF4-FFF2-40B4-BE49-F238E27FC236}">
-                <a16:creationId xmlns:a16="http://schemas.microsoft.com/office/drawing/2014/main" id="{69BACAF3-35DA-40A1-A62F-F11FCF7F87AB}"/>
-              </a:ext>
-            </a:extLst>
-          </p:cNvPr>
-          <p:cNvSpPr>
-            <a:spLocks noGrp="1"/>
-          </p:cNvSpPr>
-          <p:nvPr>
-            <p:ph type="title"/>
-          </p:nvPr>
-        </p:nvSpPr>
-        <p:spPr/>
-        <p:txBody>
-          <a:bodyPr/>
-          <a:lstStyle/>
-          <a:p>
-            <a:r>
-              <a:rPr lang="en-US" dirty="0"/>
-              <a:t>Large photo with quote</a:t>
-            </a:r>
-          </a:p>
-        </p:txBody>
-      </p:sp>
-      <p:sp>
-        <p:nvSpPr>
-          <p:cNvPr id="5" name="Text Placeholder 4">
-            <a:extLst>
-              <a:ext uri="{FF2B5EF4-FFF2-40B4-BE49-F238E27FC236}">
-                <a16:creationId xmlns:a16="http://schemas.microsoft.com/office/drawing/2014/main" id="{85195BC3-CA49-43AA-943D-145C631E91F3}"/>
-              </a:ext>
-            </a:extLst>
-          </p:cNvPr>
-          <p:cNvSpPr>
-            <a:spLocks noGrp="1"/>
-          </p:cNvSpPr>
-          <p:nvPr>
-            <p:ph type="body" sz="quarter" idx="26"/>
-          </p:nvPr>
-        </p:nvSpPr>
-        <p:spPr/>
-        <p:txBody>
-          <a:bodyPr/>
-          <a:lstStyle/>
-          <a:p>
-            <a:r>
-              <a:rPr lang="en-US" dirty="0"/>
-              <a:t>“Place your quote here”</a:t>
-            </a:r>
-          </a:p>
-        </p:txBody>
-      </p:sp>
-      <p:sp>
-        <p:nvSpPr>
-          <p:cNvPr id="6" name="Text Placeholder 5">
-            <a:extLst>
-              <a:ext uri="{FF2B5EF4-FFF2-40B4-BE49-F238E27FC236}">
-                <a16:creationId xmlns:a16="http://schemas.microsoft.com/office/drawing/2014/main" id="{59EDDC39-7E24-4663-B47E-EFC6A37DCA0D}"/>
-              </a:ext>
-            </a:extLst>
-          </p:cNvPr>
-          <p:cNvSpPr>
-            <a:spLocks noGrp="1"/>
-          </p:cNvSpPr>
-          <p:nvPr>
-            <p:ph type="body" sz="quarter" idx="25"/>
-          </p:nvPr>
-        </p:nvSpPr>
-        <p:spPr/>
-        <p:txBody>
-          <a:bodyPr/>
-          <a:lstStyle/>
-          <a:p>
-            <a:r>
-              <a:rPr lang="en-US" dirty="0"/>
-              <a:t>Quote date or place</a:t>
-            </a:r>
-          </a:p>
-        </p:txBody>
-      </p:sp>
-    </p:spTree>
-    <p:extLst>
-      <p:ext uri="{BB962C8B-B14F-4D97-AF65-F5344CB8AC3E}">
-        <p14:creationId xmlns:p14="http://schemas.microsoft.com/office/powerpoint/2010/main" val="183236352"/>
-      </p:ext>
-    </p:extLst>
-  </p:cSld>
-  <p:clrMapOvr>
-    <a:masterClrMapping/>
-  </p:clrMapOvr>
-</p:sld>
-</file>
-
-<file path=ppt/slides/slide8.xml><?xml version="1.0" encoding="utf-8"?>
-<p:sld xmlns:a="http://schemas.openxmlformats.org/drawingml/2006/main" xmlns:r="http://schemas.openxmlformats.org/officeDocument/2006/relationships" xmlns:p="http://schemas.openxmlformats.org/presentationml/2006/main">
-  <p:cSld>
-    <p:spTree>
-      <p:nvGrpSpPr>
-        <p:cNvPr id="1" name=""/>
-        <p:cNvGrpSpPr/>
-        <p:nvPr/>
-      </p:nvGrpSpPr>
-      <p:grpSpPr>
-        <a:xfrm>
-          <a:off x="0" y="0"/>
-          <a:ext cx="0" cy="0"/>
-          <a:chOff x="0" y="0"/>
-          <a:chExt cx="0" cy="0"/>
-        </a:xfrm>
-      </p:grpSpPr>
-      <p:sp>
-        <p:nvSpPr>
-          <p:cNvPr id="27" name="Picture Placeholder 26" descr="Picture Placeholder">
-            <a:extLst>
-              <a:ext uri="{FF2B5EF4-FFF2-40B4-BE49-F238E27FC236}">
-                <a16:creationId xmlns:a16="http://schemas.microsoft.com/office/drawing/2014/main" id="{8A3CA052-6658-4E1A-851A-E824CCA46C15}"/>
-              </a:ext>
-            </a:extLst>
-          </p:cNvPr>
-          <p:cNvSpPr>
-            <a:spLocks noGrp="1"/>
-          </p:cNvSpPr>
-          <p:nvPr>
-            <p:ph type="pic" sz="quarter" idx="20"/>
-          </p:nvPr>
-        </p:nvSpPr>
-        <p:spPr/>
-      </p:sp>
-      <p:sp>
-        <p:nvSpPr>
-          <p:cNvPr id="28" name="Picture Placeholder 27" descr="Picture Placeholder">
-            <a:extLst>
-              <a:ext uri="{FF2B5EF4-FFF2-40B4-BE49-F238E27FC236}">
-                <a16:creationId xmlns:a16="http://schemas.microsoft.com/office/drawing/2014/main" id="{18EE7656-71BF-48D5-AA7C-3A58D010D890}"/>
-              </a:ext>
-            </a:extLst>
-          </p:cNvPr>
-          <p:cNvSpPr>
-            <a:spLocks noGrp="1"/>
-          </p:cNvSpPr>
-          <p:nvPr>
-            <p:ph type="pic" sz="quarter" idx="21"/>
-          </p:nvPr>
-        </p:nvSpPr>
-        <p:spPr/>
-      </p:sp>
-      <p:sp>
-        <p:nvSpPr>
-          <p:cNvPr id="29" name="Picture Placeholder 28" descr="Picture Placeholder">
-            <a:extLst>
-              <a:ext uri="{FF2B5EF4-FFF2-40B4-BE49-F238E27FC236}">
-                <a16:creationId xmlns:a16="http://schemas.microsoft.com/office/drawing/2014/main" id="{8A3D1381-F90E-46F3-81A0-2217F8CDE520}"/>
-              </a:ext>
-            </a:extLst>
-          </p:cNvPr>
-          <p:cNvSpPr>
-            <a:spLocks noGrp="1"/>
-          </p:cNvSpPr>
-          <p:nvPr>
-            <p:ph type="pic" sz="quarter" idx="22"/>
-          </p:nvPr>
-        </p:nvSpPr>
-        <p:spPr/>
-      </p:sp>
-      <p:sp>
-        <p:nvSpPr>
-          <p:cNvPr id="24" name="Text Placeholder 23">
-            <a:extLst>
-              <a:ext uri="{FF2B5EF4-FFF2-40B4-BE49-F238E27FC236}">
-                <a16:creationId xmlns:a16="http://schemas.microsoft.com/office/drawing/2014/main" id="{B639CC57-DF03-441F-BE46-4048B82D7590}"/>
-              </a:ext>
-            </a:extLst>
-          </p:cNvPr>
-          <p:cNvSpPr>
-            <a:spLocks noGrp="1"/>
-          </p:cNvSpPr>
-          <p:nvPr>
-            <p:ph type="body" sz="quarter" idx="24"/>
-          </p:nvPr>
-        </p:nvSpPr>
-        <p:spPr/>
-        <p:txBody>
-          <a:bodyPr/>
-          <a:lstStyle/>
-          <a:p>
-            <a:r>
-              <a:rPr lang="en-US" dirty="0"/>
-              <a:t>Place your photo caption here</a:t>
-            </a:r>
-          </a:p>
-        </p:txBody>
-      </p:sp>
-      <p:sp>
-        <p:nvSpPr>
-          <p:cNvPr id="25" name="Picture Placeholder 24" descr="Picture Placeholder">
-            <a:extLst>
-              <a:ext uri="{FF2B5EF4-FFF2-40B4-BE49-F238E27FC236}">
-                <a16:creationId xmlns:a16="http://schemas.microsoft.com/office/drawing/2014/main" id="{236562A2-10BA-4343-9126-27DF6C423CF7}"/>
-              </a:ext>
-            </a:extLst>
-          </p:cNvPr>
-          <p:cNvSpPr>
-            <a:spLocks noGrp="1"/>
-          </p:cNvSpPr>
-          <p:nvPr>
-            <p:ph type="pic" sz="quarter" idx="18"/>
-          </p:nvPr>
-        </p:nvSpPr>
-        <p:spPr/>
-      </p:sp>
-      <p:sp>
-        <p:nvSpPr>
-          <p:cNvPr id="3" name="Text Placeholder 2">
-            <a:extLst>
-              <a:ext uri="{FF2B5EF4-FFF2-40B4-BE49-F238E27FC236}">
-                <a16:creationId xmlns:a16="http://schemas.microsoft.com/office/drawing/2014/main" id="{C0C1A276-720E-40C4-8C25-F52ACCEF61DE}"/>
-              </a:ext>
-            </a:extLst>
-          </p:cNvPr>
-          <p:cNvSpPr>
-            <a:spLocks noGrp="1"/>
-          </p:cNvSpPr>
-          <p:nvPr>
-            <p:ph type="body" sz="quarter" idx="16"/>
-          </p:nvPr>
-        </p:nvSpPr>
-        <p:spPr/>
-        <p:txBody>
-          <a:bodyPr/>
-          <a:lstStyle/>
-          <a:p>
-            <a:r>
-              <a:rPr lang="en-US" dirty="0"/>
-              <a:t>MM 20YY</a:t>
-            </a:r>
-          </a:p>
-        </p:txBody>
-      </p:sp>
-      <p:sp>
-        <p:nvSpPr>
-          <p:cNvPr id="4" name="Text Placeholder 3">
-            <a:extLst>
-              <a:ext uri="{FF2B5EF4-FFF2-40B4-BE49-F238E27FC236}">
-                <a16:creationId xmlns:a16="http://schemas.microsoft.com/office/drawing/2014/main" id="{41E21631-E867-4474-A0AB-B8DA732A48FA}"/>
-              </a:ext>
-            </a:extLst>
-          </p:cNvPr>
-          <p:cNvSpPr>
-            <a:spLocks noGrp="1"/>
-          </p:cNvSpPr>
-          <p:nvPr>
-            <p:ph type="body" sz="quarter" idx="14"/>
-          </p:nvPr>
-        </p:nvSpPr>
-        <p:spPr/>
-        <p:txBody>
-          <a:bodyPr/>
-          <a:lstStyle/>
-          <a:p>
-            <a:r>
-              <a:rPr lang="en-US" dirty="0"/>
-              <a:t>A lifetime of loyal service started in Month Year</a:t>
-            </a:r>
-          </a:p>
-        </p:txBody>
-      </p:sp>
-      <p:sp>
-        <p:nvSpPr>
-          <p:cNvPr id="5" name="Text Placeholder 4">
-            <a:extLst>
-              <a:ext uri="{FF2B5EF4-FFF2-40B4-BE49-F238E27FC236}">
-                <a16:creationId xmlns:a16="http://schemas.microsoft.com/office/drawing/2014/main" id="{02788C3F-BF68-4F7D-9FD3-203AA0F81D00}"/>
-              </a:ext>
-            </a:extLst>
-          </p:cNvPr>
-          <p:cNvSpPr>
-            <a:spLocks noGrp="1"/>
-          </p:cNvSpPr>
-          <p:nvPr>
-            <p:ph type="body" sz="quarter" idx="15"/>
-          </p:nvPr>
-        </p:nvSpPr>
-        <p:spPr/>
-        <p:txBody>
-          <a:bodyPr/>
-          <a:lstStyle/>
-          <a:p>
-            <a:r>
-              <a:rPr lang="en-US" dirty="0"/>
-              <a:t>Lorem </a:t>
-            </a:r>
-            <a:r>
-              <a:rPr lang="en-US" noProof="1"/>
-              <a:t>ipsum dolor sit amet, consectetur adipiscing elit.</a:t>
-            </a:r>
-          </a:p>
-        </p:txBody>
-      </p:sp>
-      <p:sp>
-        <p:nvSpPr>
-          <p:cNvPr id="6" name="Slide Number Placeholder 5">
-            <a:extLst>
-              <a:ext uri="{FF2B5EF4-FFF2-40B4-BE49-F238E27FC236}">
-                <a16:creationId xmlns:a16="http://schemas.microsoft.com/office/drawing/2014/main" id="{78591B84-5676-4CBE-A23F-62891B1252FE}"/>
-              </a:ext>
-            </a:extLst>
-          </p:cNvPr>
-          <p:cNvSpPr>
-            <a:spLocks noGrp="1"/>
-          </p:cNvSpPr>
-          <p:nvPr>
-            <p:ph type="sldNum" sz="quarter" idx="11"/>
-          </p:nvPr>
-        </p:nvSpPr>
-        <p:spPr/>
-        <p:txBody>
-          <a:bodyPr/>
-          <a:lstStyle/>
-          <a:p>
-            <a:fld id="{26699011-AD31-4C1E-9097-A1CA72DD0DA4}" type="slidenum">
-              <a:rPr lang="en-US" smtClean="0"/>
-              <a:pPr/>
-              <a:t>8</a:t>
-            </a:fld>
-            <a:endParaRPr lang="en-US" dirty="0"/>
-          </a:p>
-        </p:txBody>
-      </p:sp>
-      <p:sp>
-        <p:nvSpPr>
-          <p:cNvPr id="7" name="Text Placeholder 6">
-            <a:extLst>
-              <a:ext uri="{FF2B5EF4-FFF2-40B4-BE49-F238E27FC236}">
-                <a16:creationId xmlns:a16="http://schemas.microsoft.com/office/drawing/2014/main" id="{E91FA764-04D6-4EF8-A3E3-2E23DE9AB081}"/>
-              </a:ext>
-            </a:extLst>
-          </p:cNvPr>
-          <p:cNvSpPr>
-            <a:spLocks noGrp="1"/>
-          </p:cNvSpPr>
-          <p:nvPr>
-            <p:ph type="body" sz="quarter" idx="12"/>
-          </p:nvPr>
-        </p:nvSpPr>
-        <p:spPr/>
-        <p:txBody>
-          <a:bodyPr/>
-          <a:lstStyle/>
-          <a:p>
-            <a:r>
-              <a:rPr lang="en-US" dirty="0"/>
-              <a:t>Celebrating the retirement of:</a:t>
-            </a:r>
-          </a:p>
-        </p:txBody>
-      </p:sp>
-      <p:sp>
-        <p:nvSpPr>
-          <p:cNvPr id="9" name="Text Placeholder 8">
-            <a:extLst>
-              <a:ext uri="{FF2B5EF4-FFF2-40B4-BE49-F238E27FC236}">
-                <a16:creationId xmlns:a16="http://schemas.microsoft.com/office/drawing/2014/main" id="{1D226037-F2FE-428F-8D45-05FAD6BFC3A9}"/>
-              </a:ext>
-            </a:extLst>
-          </p:cNvPr>
-          <p:cNvSpPr>
-            <a:spLocks noGrp="1"/>
-          </p:cNvSpPr>
-          <p:nvPr>
-            <p:ph type="body" sz="quarter" idx="17"/>
-          </p:nvPr>
-        </p:nvSpPr>
-        <p:spPr/>
-        <p:txBody>
-          <a:bodyPr/>
-          <a:lstStyle/>
-          <a:p>
-            <a:r>
-              <a:rPr lang="en-US" dirty="0"/>
-              <a:t>Lorem ipsum dolor sit amet</a:t>
-            </a:r>
-          </a:p>
-        </p:txBody>
-      </p:sp>
-      <p:sp>
-        <p:nvSpPr>
-          <p:cNvPr id="26" name="Picture Placeholder 25" descr="Picture Placeholder">
-            <a:extLst>
-              <a:ext uri="{FF2B5EF4-FFF2-40B4-BE49-F238E27FC236}">
-                <a16:creationId xmlns:a16="http://schemas.microsoft.com/office/drawing/2014/main" id="{74B4C9EA-4D60-48DE-9915-B57516D650F8}"/>
-              </a:ext>
-            </a:extLst>
-          </p:cNvPr>
-          <p:cNvSpPr>
-            <a:spLocks noGrp="1"/>
-          </p:cNvSpPr>
-          <p:nvPr>
-            <p:ph type="pic" sz="quarter" idx="19"/>
-          </p:nvPr>
-        </p:nvSpPr>
-        <p:spPr/>
-      </p:sp>
-      <p:sp>
-        <p:nvSpPr>
-          <p:cNvPr id="23" name="Text Placeholder 22">
-            <a:extLst>
-              <a:ext uri="{FF2B5EF4-FFF2-40B4-BE49-F238E27FC236}">
-                <a16:creationId xmlns:a16="http://schemas.microsoft.com/office/drawing/2014/main" id="{719633D1-F8B7-48A2-914F-B7CF795760D3}"/>
-              </a:ext>
-            </a:extLst>
-          </p:cNvPr>
-          <p:cNvSpPr>
-            <a:spLocks noGrp="1"/>
-          </p:cNvSpPr>
-          <p:nvPr>
-            <p:ph type="body" sz="quarter" idx="23"/>
-          </p:nvPr>
-        </p:nvSpPr>
-        <p:spPr/>
-        <p:txBody>
-          <a:bodyPr/>
-          <a:lstStyle/>
-          <a:p>
-            <a:r>
-              <a:rPr lang="en-US" dirty="0"/>
-              <a:t>Celebrating the retirement of:</a:t>
-            </a:r>
-          </a:p>
-        </p:txBody>
-      </p:sp>
-      <p:sp>
-        <p:nvSpPr>
-          <p:cNvPr id="17" name="Title 16">
-            <a:extLst>
-              <a:ext uri="{FF2B5EF4-FFF2-40B4-BE49-F238E27FC236}">
-                <a16:creationId xmlns:a16="http://schemas.microsoft.com/office/drawing/2014/main" id="{4A3716E1-DF36-4A1C-BCD5-CECB9199FF7F}"/>
-              </a:ext>
-            </a:extLst>
-          </p:cNvPr>
-          <p:cNvSpPr>
-            <a:spLocks noGrp="1"/>
-          </p:cNvSpPr>
-          <p:nvPr>
-            <p:ph type="title"/>
-          </p:nvPr>
-        </p:nvSpPr>
-        <p:spPr/>
-        <p:txBody>
-          <a:bodyPr/>
-          <a:lstStyle/>
-          <a:p>
-            <a:r>
-              <a:rPr lang="en-US" dirty="0"/>
-              <a:t>ALLAN MARTENSSON</a:t>
-            </a:r>
-          </a:p>
-        </p:txBody>
-      </p:sp>
-    </p:spTree>
-    <p:extLst>
-      <p:ext uri="{BB962C8B-B14F-4D97-AF65-F5344CB8AC3E}">
-        <p14:creationId xmlns:p14="http://schemas.microsoft.com/office/powerpoint/2010/main" val="62837122"/>
-      </p:ext>
-    </p:extLst>
-  </p:cSld>
-  <p:clrMapOvr>
-    <a:masterClrMapping/>
-  </p:clrMapOvr>
-</p:sld>
-</file>
-
-<file path=ppt/slides/slide9.xml><?xml version="1.0" encoding="utf-8"?>
-<p:sld xmlns:a="http://schemas.openxmlformats.org/drawingml/2006/main" xmlns:r="http://schemas.openxmlformats.org/officeDocument/2006/relationships" xmlns:p="http://schemas.openxmlformats.org/presentationml/2006/main">
-  <p:cSld>
-    <p:spTree>
-      <p:nvGrpSpPr>
-        <p:cNvPr id="1" name=""/>
-        <p:cNvGrpSpPr/>
-        <p:nvPr/>
-      </p:nvGrpSpPr>
-      <p:grpSpPr>
-        <a:xfrm>
-          <a:off x="0" y="0"/>
-          <a:ext cx="0" cy="0"/>
-          <a:chOff x="0" y="0"/>
-          <a:chExt cx="0" cy="0"/>
-        </a:xfrm>
-      </p:grpSpPr>
-      <p:sp>
-        <p:nvSpPr>
-          <p:cNvPr id="2" name="Slide Number Placeholder 1">
-            <a:extLst>
-              <a:ext uri="{FF2B5EF4-FFF2-40B4-BE49-F238E27FC236}">
-                <a16:creationId xmlns:a16="http://schemas.microsoft.com/office/drawing/2014/main" id="{79FA378D-DD84-4591-8FB7-2E1F35C45007}"/>
-              </a:ext>
-            </a:extLst>
-          </p:cNvPr>
-          <p:cNvSpPr>
-            <a:spLocks noGrp="1"/>
-          </p:cNvSpPr>
-          <p:nvPr>
-            <p:ph type="sldNum" sz="quarter" idx="27"/>
-          </p:nvPr>
-        </p:nvSpPr>
-        <p:spPr>
-          <a:xfrm>
-            <a:off x="11473200" y="6314825"/>
-            <a:ext cx="360000" cy="360000"/>
-          </a:xfrm>
-        </p:spPr>
-        <p:txBody>
-          <a:bodyPr/>
-          <a:lstStyle/>
-          <a:p>
-            <a:fld id="{26699011-AD31-4C1E-9097-A1CA72DD0DA4}" type="slidenum">
-              <a:rPr lang="en-US" smtClean="0"/>
-              <a:t>9</a:t>
-            </a:fld>
-            <a:endParaRPr lang="en-US" dirty="0"/>
-          </a:p>
-        </p:txBody>
-      </p:sp>
-      <p:sp>
-        <p:nvSpPr>
-          <p:cNvPr id="3" name="Title 2">
-            <a:extLst>
-              <a:ext uri="{FF2B5EF4-FFF2-40B4-BE49-F238E27FC236}">
-                <a16:creationId xmlns:a16="http://schemas.microsoft.com/office/drawing/2014/main" id="{804DF0BC-FF6D-4A57-B5B0-6E7A67BBAF13}"/>
-              </a:ext>
-            </a:extLst>
-          </p:cNvPr>
-          <p:cNvSpPr>
-            <a:spLocks noGrp="1"/>
-          </p:cNvSpPr>
-          <p:nvPr>
-            <p:ph type="title"/>
-          </p:nvPr>
-        </p:nvSpPr>
-        <p:spPr>
-          <a:xfrm>
-            <a:off x="504000" y="359999"/>
-            <a:ext cx="2982435" cy="941192"/>
-          </a:xfrm>
-        </p:spPr>
-        <p:txBody>
-          <a:bodyPr/>
-          <a:lstStyle/>
-          <a:p>
-            <a:r>
-              <a:rPr lang="en-US" dirty="0"/>
-              <a:t>Lorem ipsum dolor sit amet</a:t>
-            </a:r>
-          </a:p>
-        </p:txBody>
-      </p:sp>
-      <p:sp>
-        <p:nvSpPr>
-          <p:cNvPr id="4" name="Picture Placeholder 3" descr="Picture Placeholder">
-            <a:extLst>
-              <a:ext uri="{FF2B5EF4-FFF2-40B4-BE49-F238E27FC236}">
-                <a16:creationId xmlns:a16="http://schemas.microsoft.com/office/drawing/2014/main" id="{52EB6368-1A65-4F6F-A747-115378A6CD2B}"/>
-              </a:ext>
-            </a:extLst>
-          </p:cNvPr>
-          <p:cNvSpPr>
-            <a:spLocks noGrp="1"/>
-          </p:cNvSpPr>
-          <p:nvPr>
-            <p:ph type="pic" sz="quarter" idx="12"/>
-          </p:nvPr>
-        </p:nvSpPr>
-        <p:spPr>
-          <a:xfrm>
-            <a:off x="504000" y="1754341"/>
-            <a:ext cx="3771720" cy="4190384"/>
-          </a:xfrm>
-        </p:spPr>
-      </p:sp>
-      <p:sp>
-        <p:nvSpPr>
-          <p:cNvPr id="7" name="Picture Placeholder 6" descr="Picture Placeholder">
-            <a:extLst>
-              <a:ext uri="{FF2B5EF4-FFF2-40B4-BE49-F238E27FC236}">
-                <a16:creationId xmlns:a16="http://schemas.microsoft.com/office/drawing/2014/main" id="{EC84771B-53C1-4CB9-9C9D-D26609E3A6EB}"/>
-              </a:ext>
-            </a:extLst>
-          </p:cNvPr>
-          <p:cNvSpPr>
-            <a:spLocks noGrp="1"/>
-          </p:cNvSpPr>
-          <p:nvPr>
-            <p:ph type="pic" sz="quarter" idx="15"/>
-          </p:nvPr>
-        </p:nvSpPr>
-        <p:spPr/>
-      </p:sp>
-      <p:sp>
-        <p:nvSpPr>
-          <p:cNvPr id="8" name="Text Placeholder 7">
-            <a:extLst>
-              <a:ext uri="{FF2B5EF4-FFF2-40B4-BE49-F238E27FC236}">
-                <a16:creationId xmlns:a16="http://schemas.microsoft.com/office/drawing/2014/main" id="{BA5C46C8-7AEC-4B80-A502-878CAAB06E45}"/>
-              </a:ext>
-            </a:extLst>
-          </p:cNvPr>
-          <p:cNvSpPr>
-            <a:spLocks noGrp="1"/>
-          </p:cNvSpPr>
-          <p:nvPr>
-            <p:ph type="body" sz="quarter" idx="24"/>
-          </p:nvPr>
-        </p:nvSpPr>
-        <p:spPr/>
-        <p:txBody>
-          <a:bodyPr/>
-          <a:lstStyle/>
-          <a:p>
-            <a:r>
-              <a:rPr lang="en-US" dirty="0"/>
-              <a:t>Place your photo caption here</a:t>
-            </a:r>
-          </a:p>
-        </p:txBody>
-      </p:sp>
-      <p:sp>
-        <p:nvSpPr>
-          <p:cNvPr id="10" name="Text Placeholder 9">
-            <a:extLst>
-              <a:ext uri="{FF2B5EF4-FFF2-40B4-BE49-F238E27FC236}">
-                <a16:creationId xmlns:a16="http://schemas.microsoft.com/office/drawing/2014/main" id="{CD5C4BBB-56DC-4769-BB07-29F781939080}"/>
-              </a:ext>
-            </a:extLst>
-          </p:cNvPr>
-          <p:cNvSpPr>
-            <a:spLocks noGrp="1"/>
-          </p:cNvSpPr>
-          <p:nvPr>
-            <p:ph type="body" sz="quarter" idx="25"/>
-          </p:nvPr>
-        </p:nvSpPr>
-        <p:spPr/>
-        <p:txBody>
-          <a:bodyPr/>
-          <a:lstStyle/>
-          <a:p>
-            <a:r>
-              <a:rPr lang="en-US" dirty="0"/>
-              <a:t>Place your photo caption here</a:t>
-            </a:r>
-          </a:p>
-        </p:txBody>
-      </p:sp>
-      <p:sp>
-        <p:nvSpPr>
-          <p:cNvPr id="11" name="Text Placeholder 10">
-            <a:extLst>
-              <a:ext uri="{FF2B5EF4-FFF2-40B4-BE49-F238E27FC236}">
-                <a16:creationId xmlns:a16="http://schemas.microsoft.com/office/drawing/2014/main" id="{29258BDE-BFDE-DD45-843E-5BBCDE780080}"/>
-              </a:ext>
-            </a:extLst>
-          </p:cNvPr>
-          <p:cNvSpPr>
-            <a:spLocks noGrp="1"/>
-          </p:cNvSpPr>
-          <p:nvPr>
-            <p:ph type="body" sz="quarter" idx="23"/>
-          </p:nvPr>
-        </p:nvSpPr>
-        <p:spPr/>
-        <p:txBody>
-          <a:bodyPr/>
-          <a:lstStyle/>
-          <a:p>
-            <a:r>
-              <a:rPr lang="en-US" dirty="0" err="1"/>
-              <a:t>saf</a:t>
-            </a:r>
-            <a:endParaRPr lang="en-US" dirty="0"/>
-          </a:p>
-        </p:txBody>
-      </p:sp>
-    </p:spTree>
-    <p:extLst>
-      <p:ext uri="{BB962C8B-B14F-4D97-AF65-F5344CB8AC3E}">
-        <p14:creationId xmlns:p14="http://schemas.microsoft.com/office/powerpoint/2010/main" val="2006286489"/>
       </p:ext>
     </p:extLst>
   </p:cSld>
@@ -30879,23 +31926,6 @@
 </file>
 
 <file path=customXml/item1.xml><?xml version="1.0" encoding="utf-8"?>
-<?mso-contentType ?>
-<FormTemplates xmlns="http://schemas.microsoft.com/sharepoint/v3/contenttype/forms">
-  <Display>DocumentLibraryForm</Display>
-  <Edit>DocumentLibraryForm</Edit>
-  <New>DocumentLibraryForm</New>
-</FormTemplates>
-</file>
-
-<file path=customXml/item2.xml><?xml version="1.0" encoding="utf-8"?>
-<p:properties xmlns:p="http://schemas.microsoft.com/office/2006/metadata/properties" xmlns:xsi="http://www.w3.org/2001/XMLSchema-instance" xmlns:pc="http://schemas.microsoft.com/office/infopath/2007/PartnerControls">
-  <documentManagement>
-    <MediaServiceKeyPoints xmlns="71af3243-3dd4-4a8d-8c0d-dd76da1f02a5" xsi:nil="true"/>
-  </documentManagement>
-</p:properties>
-</file>
-
-<file path=customXml/item3.xml><?xml version="1.0" encoding="utf-8"?>
 <ct:contentTypeSchema xmlns:ct="http://schemas.microsoft.com/office/2006/metadata/contentType" xmlns:ma="http://schemas.microsoft.com/office/2006/metadata/properties/metaAttributes" ct:_="" ma:_="" ma:contentTypeName="Document" ma:contentTypeID="0x01010079F111ED35F8CC479449609E8A0923A6" ma:contentTypeVersion="11" ma:contentTypeDescription="Create a new document." ma:contentTypeScope="" ma:versionID="9677210f24a1be23c92c90fd886aa0aa">
   <xsd:schema xmlns:xsd="http://www.w3.org/2001/XMLSchema" xmlns:xs="http://www.w3.org/2001/XMLSchema" xmlns:p="http://schemas.microsoft.com/office/2006/metadata/properties" xmlns:ns2="71af3243-3dd4-4a8d-8c0d-dd76da1f02a5" xmlns:ns3="16c05727-aa75-4e4a-9b5f-8a80a1165891" targetNamespace="http://schemas.microsoft.com/office/2006/metadata/properties" ma:root="true" ma:fieldsID="60e05723c5c1908df1a1a4ebf11d344e" ns2:_="" ns3:_="">
     <xsd:import namespace="71af3243-3dd4-4a8d-8c0d-dd76da1f02a5"/>
@@ -31106,25 +32136,24 @@
 </ct:contentTypeSchema>
 </file>
 
-<file path=customXml/itemProps1.xml><?xml version="1.0" encoding="utf-8"?>
-<ds:datastoreItem xmlns:ds="http://schemas.openxmlformats.org/officeDocument/2006/customXml" ds:itemID="{A574FA83-37F9-42DB-9AFF-75EC5B2EB55E}">
-  <ds:schemaRefs>
-    <ds:schemaRef ds:uri="http://schemas.microsoft.com/sharepoint/v3/contenttype/forms"/>
-  </ds:schemaRefs>
-</ds:datastoreItem>
+<file path=customXml/item2.xml><?xml version="1.0" encoding="utf-8"?>
+<p:properties xmlns:p="http://schemas.microsoft.com/office/2006/metadata/properties" xmlns:xsi="http://www.w3.org/2001/XMLSchema-instance" xmlns:pc="http://schemas.microsoft.com/office/infopath/2007/PartnerControls">
+  <documentManagement>
+    <MediaServiceKeyPoints xmlns="71af3243-3dd4-4a8d-8c0d-dd76da1f02a5" xsi:nil="true"/>
+  </documentManagement>
+</p:properties>
 </file>
 
-<file path=customXml/itemProps2.xml><?xml version="1.0" encoding="utf-8"?>
-<ds:datastoreItem xmlns:ds="http://schemas.openxmlformats.org/officeDocument/2006/customXml" ds:itemID="{F15950F6-54F6-4885-8500-BA368B7E8A16}">
-  <ds:schemaRefs>
-    <ds:schemaRef ds:uri="http://schemas.microsoft.com/office/2006/metadata/properties"/>
-    <ds:schemaRef ds:uri="http://schemas.microsoft.com/office/infopath/2007/PartnerControls"/>
-    <ds:schemaRef ds:uri="71af3243-3dd4-4a8d-8c0d-dd76da1f02a5"/>
-  </ds:schemaRefs>
-</ds:datastoreItem>
+<file path=customXml/item3.xml><?xml version="1.0" encoding="utf-8"?>
+<?mso-contentType ?>
+<FormTemplates xmlns="http://schemas.microsoft.com/sharepoint/v3/contenttype/forms">
+  <Display>DocumentLibraryForm</Display>
+  <Edit>DocumentLibraryForm</Edit>
+  <New>DocumentLibraryForm</New>
+</FormTemplates>
 </file>
 
-<file path=customXml/itemProps3.xml><?xml version="1.0" encoding="utf-8"?>
+<file path=customXml/itemProps1.xml><?xml version="1.0" encoding="utf-8"?>
 <ds:datastoreItem xmlns:ds="http://schemas.openxmlformats.org/officeDocument/2006/customXml" ds:itemID="{21FDF6D1-3C7E-47EE-9431-82AF2468586B}">
   <ds:schemaRefs>
     <ds:schemaRef ds:uri="http://schemas.microsoft.com/office/2006/metadata/contentType"/>
@@ -31141,4 +32170,22 @@
     <ds:schemaRef ds:uri="http://schemas.microsoft.com/internal/obd"/>
   </ds:schemaRefs>
 </ds:datastoreItem>
+</file>
+
+<file path=customXml/itemProps2.xml><?xml version="1.0" encoding="utf-8"?>
+<ds:datastoreItem xmlns:ds="http://schemas.openxmlformats.org/officeDocument/2006/customXml" ds:itemID="{F15950F6-54F6-4885-8500-BA368B7E8A16}">
+  <ds:schemaRefs>
+    <ds:schemaRef ds:uri="http://schemas.microsoft.com/office/2006/metadata/properties"/>
+    <ds:schemaRef ds:uri="http://schemas.microsoft.com/office/infopath/2007/PartnerControls"/>
+    <ds:schemaRef ds:uri="71af3243-3dd4-4a8d-8c0d-dd76da1f02a5"/>
+  </ds:schemaRefs>
+</ds:datastoreItem>
+</file>
+
+<file path=customXml/itemProps3.xml><?xml version="1.0" encoding="utf-8"?>
+<ds:datastoreItem xmlns:ds="http://schemas.openxmlformats.org/officeDocument/2006/customXml" ds:itemID="{A574FA83-37F9-42DB-9AFF-75EC5B2EB55E}">
+  <ds:schemaRefs>
+    <ds:schemaRef ds:uri="http://schemas.microsoft.com/sharepoint/v3/contenttype/forms"/>
+  </ds:schemaRefs>
+</ds:datastoreItem>
 </file>
</xml_diff>